<commit_message>
Updates hex sticker on reticulate cheatsheet
</commit_message>
<xml_diff>
--- a/powerpoints/reticulate.pptx
+++ b/powerpoints/reticulate.pptx
@@ -815,8 +815,8 @@
         </p:nvSpPr>
         <p:spPr>
           <a:xfrm>
-            <a:off x="0" y="158750"/>
-            <a:ext cx="13964218" cy="10477500"/>
+            <a:off x="-873125" y="158750"/>
+            <a:ext cx="15708068" cy="10477500"/>
           </a:xfrm>
           <a:prstGeom prst="rect">
             <a:avLst/>
@@ -1075,7 +1075,7 @@
         <p:spPr>
           <a:xfrm>
             <a:off x="1725786" y="840878"/>
-            <a:ext cx="10504786" cy="6357443"/>
+            <a:ext cx="10504786" cy="7006839"/>
           </a:xfrm>
           <a:prstGeom prst="rect">
             <a:avLst/>
@@ -1350,13 +1350,13 @@
           <p:cNvPr id="38" name="Image"/>
           <p:cNvSpPr/>
           <p:nvPr>
-            <p:ph type="pic" sz="half" idx="13"/>
+            <p:ph type="pic" idx="13"/>
           </p:nvPr>
         </p:nvSpPr>
         <p:spPr>
           <a:xfrm>
-            <a:off x="7216923" y="840878"/>
-            <a:ext cx="5729884" cy="8840392"/>
+            <a:off x="2919511" y="840878"/>
+            <a:ext cx="13274230" cy="8849488"/>
           </a:xfrm>
           <a:prstGeom prst="rect">
             <a:avLst/>
@@ -1752,13 +1752,13 @@
           <p:cNvPr id="65" name="Image"/>
           <p:cNvSpPr/>
           <p:nvPr>
-            <p:ph type="pic" sz="half" idx="13"/>
+            <p:ph type="pic" idx="13"/>
           </p:nvPr>
         </p:nvSpPr>
         <p:spPr>
           <a:xfrm>
-            <a:off x="7216923" y="2955478"/>
-            <a:ext cx="5729884" cy="6753077"/>
+            <a:off x="4870400" y="2955478"/>
+            <a:ext cx="10129615" cy="6753077"/>
           </a:xfrm>
           <a:prstGeom prst="rect">
             <a:avLst/>
@@ -2019,13 +2019,13 @@
           <p:cNvPr id="83" name="Image"/>
           <p:cNvSpPr/>
           <p:nvPr>
-            <p:ph type="pic" sz="half" idx="13"/>
+            <p:ph type="pic" idx="13"/>
           </p:nvPr>
         </p:nvSpPr>
         <p:spPr>
           <a:xfrm>
-            <a:off x="1023193" y="1113730"/>
-            <a:ext cx="5729884" cy="8567540"/>
+            <a:off x="-2551163" y="1113730"/>
+            <a:ext cx="12864953" cy="8576636"/>
           </a:xfrm>
           <a:prstGeom prst="rect">
             <a:avLst/>
@@ -2051,8 +2051,8 @@
         </p:nvSpPr>
         <p:spPr>
           <a:xfrm>
-            <a:off x="7216923" y="5629423"/>
-            <a:ext cx="5729884" cy="4051847"/>
+            <a:off x="7175996" y="5558791"/>
+            <a:ext cx="6507511" cy="4340601"/>
           </a:xfrm>
           <a:prstGeom prst="rect">
             <a:avLst/>
@@ -2078,8 +2078,8 @@
         </p:nvSpPr>
         <p:spPr>
           <a:xfrm>
-            <a:off x="7223603" y="1113730"/>
-            <a:ext cx="5729884" cy="4051847"/>
+            <a:off x="6985000" y="1111310"/>
+            <a:ext cx="6302872" cy="4201915"/>
           </a:xfrm>
           <a:prstGeom prst="rect">
             <a:avLst/>
@@ -2333,9 +2333,6 @@
         <a:buNone/>
         <a:tabLst/>
         <a:defRPr b="0" baseline="0" cap="none" i="0" spc="0" strike="noStrike" sz="4800" u="none">
-          <a:ln>
-            <a:noFill/>
-          </a:ln>
           <a:solidFill>
             <a:srgbClr val="585858"/>
           </a:solidFill>
@@ -2362,9 +2359,6 @@
         <a:buNone/>
         <a:tabLst/>
         <a:defRPr b="0" baseline="0" cap="none" i="0" spc="0" strike="noStrike" sz="4800" u="none">
-          <a:ln>
-            <a:noFill/>
-          </a:ln>
           <a:solidFill>
             <a:srgbClr val="585858"/>
           </a:solidFill>
@@ -2391,9 +2385,6 @@
         <a:buNone/>
         <a:tabLst/>
         <a:defRPr b="0" baseline="0" cap="none" i="0" spc="0" strike="noStrike" sz="4800" u="none">
-          <a:ln>
-            <a:noFill/>
-          </a:ln>
           <a:solidFill>
             <a:srgbClr val="585858"/>
           </a:solidFill>
@@ -2420,9 +2411,6 @@
         <a:buNone/>
         <a:tabLst/>
         <a:defRPr b="0" baseline="0" cap="none" i="0" spc="0" strike="noStrike" sz="4800" u="none">
-          <a:ln>
-            <a:noFill/>
-          </a:ln>
           <a:solidFill>
             <a:srgbClr val="585858"/>
           </a:solidFill>
@@ -2449,9 +2437,6 @@
         <a:buNone/>
         <a:tabLst/>
         <a:defRPr b="0" baseline="0" cap="none" i="0" spc="0" strike="noStrike" sz="4800" u="none">
-          <a:ln>
-            <a:noFill/>
-          </a:ln>
           <a:solidFill>
             <a:srgbClr val="585858"/>
           </a:solidFill>
@@ -2478,9 +2463,6 @@
         <a:buNone/>
         <a:tabLst/>
         <a:defRPr b="0" baseline="0" cap="none" i="0" spc="0" strike="noStrike" sz="4800" u="none">
-          <a:ln>
-            <a:noFill/>
-          </a:ln>
           <a:solidFill>
             <a:srgbClr val="585858"/>
           </a:solidFill>
@@ -2507,9 +2489,6 @@
         <a:buNone/>
         <a:tabLst/>
         <a:defRPr b="0" baseline="0" cap="none" i="0" spc="0" strike="noStrike" sz="4800" u="none">
-          <a:ln>
-            <a:noFill/>
-          </a:ln>
           <a:solidFill>
             <a:srgbClr val="585858"/>
           </a:solidFill>
@@ -2536,9 +2515,6 @@
         <a:buNone/>
         <a:tabLst/>
         <a:defRPr b="0" baseline="0" cap="none" i="0" spc="0" strike="noStrike" sz="4800" u="none">
-          <a:ln>
-            <a:noFill/>
-          </a:ln>
           <a:solidFill>
             <a:srgbClr val="585858"/>
           </a:solidFill>
@@ -2565,9 +2541,6 @@
         <a:buNone/>
         <a:tabLst/>
         <a:defRPr b="0" baseline="0" cap="none" i="0" spc="0" strike="noStrike" sz="4800" u="none">
-          <a:ln>
-            <a:noFill/>
-          </a:ln>
           <a:solidFill>
             <a:srgbClr val="585858"/>
           </a:solidFill>
@@ -2596,9 +2569,6 @@
         <a:buChar char="•"/>
         <a:tabLst/>
         <a:defRPr b="0" baseline="0" cap="none" i="0" spc="0" strike="noStrike" sz="1000" u="none">
-          <a:ln>
-            <a:noFill/>
-          </a:ln>
           <a:solidFill>
             <a:srgbClr val="000000"/>
           </a:solidFill>
@@ -2625,9 +2595,6 @@
         <a:buChar char="•"/>
         <a:tabLst/>
         <a:defRPr b="0" baseline="0" cap="none" i="0" spc="0" strike="noStrike" sz="1000" u="none">
-          <a:ln>
-            <a:noFill/>
-          </a:ln>
           <a:solidFill>
             <a:srgbClr val="000000"/>
           </a:solidFill>
@@ -2654,9 +2621,6 @@
         <a:buChar char="•"/>
         <a:tabLst/>
         <a:defRPr b="0" baseline="0" cap="none" i="0" spc="0" strike="noStrike" sz="1000" u="none">
-          <a:ln>
-            <a:noFill/>
-          </a:ln>
           <a:solidFill>
             <a:srgbClr val="000000"/>
           </a:solidFill>
@@ -2683,9 +2647,6 @@
         <a:buChar char="•"/>
         <a:tabLst/>
         <a:defRPr b="0" baseline="0" cap="none" i="0" spc="0" strike="noStrike" sz="1000" u="none">
-          <a:ln>
-            <a:noFill/>
-          </a:ln>
           <a:solidFill>
             <a:srgbClr val="000000"/>
           </a:solidFill>
@@ -2712,9 +2673,6 @@
         <a:buChar char="•"/>
         <a:tabLst/>
         <a:defRPr b="0" baseline="0" cap="none" i="0" spc="0" strike="noStrike" sz="1000" u="none">
-          <a:ln>
-            <a:noFill/>
-          </a:ln>
           <a:solidFill>
             <a:srgbClr val="000000"/>
           </a:solidFill>
@@ -2741,9 +2699,6 @@
         <a:buChar char="•"/>
         <a:tabLst/>
         <a:defRPr b="0" baseline="0" cap="none" i="0" spc="0" strike="noStrike" sz="1000" u="none">
-          <a:ln>
-            <a:noFill/>
-          </a:ln>
           <a:solidFill>
             <a:srgbClr val="000000"/>
           </a:solidFill>
@@ -2770,9 +2725,6 @@
         <a:buChar char="•"/>
         <a:tabLst/>
         <a:defRPr b="0" baseline="0" cap="none" i="0" spc="0" strike="noStrike" sz="1000" u="none">
-          <a:ln>
-            <a:noFill/>
-          </a:ln>
           <a:solidFill>
             <a:srgbClr val="000000"/>
           </a:solidFill>
@@ -2799,9 +2751,6 @@
         <a:buChar char="•"/>
         <a:tabLst/>
         <a:defRPr b="0" baseline="0" cap="none" i="0" spc="0" strike="noStrike" sz="1000" u="none">
-          <a:ln>
-            <a:noFill/>
-          </a:ln>
           <a:solidFill>
             <a:srgbClr val="000000"/>
           </a:solidFill>
@@ -2828,9 +2777,6 @@
         <a:buChar char="•"/>
         <a:tabLst/>
         <a:defRPr b="0" baseline="0" cap="none" i="0" spc="0" strike="noStrike" sz="1000" u="none">
-          <a:ln>
-            <a:noFill/>
-          </a:ln>
           <a:solidFill>
             <a:srgbClr val="000000"/>
           </a:solidFill>
@@ -2859,9 +2805,6 @@
         <a:buNone/>
         <a:tabLst/>
         <a:defRPr b="0" baseline="0" cap="none" i="0" spc="0" strike="noStrike" sz="1800" u="none">
-          <a:ln>
-            <a:noFill/>
-          </a:ln>
           <a:solidFill>
             <a:schemeClr val="tx1"/>
           </a:solidFill>
@@ -2888,9 +2831,6 @@
         <a:buNone/>
         <a:tabLst/>
         <a:defRPr b="0" baseline="0" cap="none" i="0" spc="0" strike="noStrike" sz="1800" u="none">
-          <a:ln>
-            <a:noFill/>
-          </a:ln>
           <a:solidFill>
             <a:schemeClr val="tx1"/>
           </a:solidFill>
@@ -2917,9 +2857,6 @@
         <a:buNone/>
         <a:tabLst/>
         <a:defRPr b="0" baseline="0" cap="none" i="0" spc="0" strike="noStrike" sz="1800" u="none">
-          <a:ln>
-            <a:noFill/>
-          </a:ln>
           <a:solidFill>
             <a:schemeClr val="tx1"/>
           </a:solidFill>
@@ -2946,9 +2883,6 @@
         <a:buNone/>
         <a:tabLst/>
         <a:defRPr b="0" baseline="0" cap="none" i="0" spc="0" strike="noStrike" sz="1800" u="none">
-          <a:ln>
-            <a:noFill/>
-          </a:ln>
           <a:solidFill>
             <a:schemeClr val="tx1"/>
           </a:solidFill>
@@ -2975,9 +2909,6 @@
         <a:buNone/>
         <a:tabLst/>
         <a:defRPr b="0" baseline="0" cap="none" i="0" spc="0" strike="noStrike" sz="1800" u="none">
-          <a:ln>
-            <a:noFill/>
-          </a:ln>
           <a:solidFill>
             <a:schemeClr val="tx1"/>
           </a:solidFill>
@@ -3004,9 +2935,6 @@
         <a:buNone/>
         <a:tabLst/>
         <a:defRPr b="0" baseline="0" cap="none" i="0" spc="0" strike="noStrike" sz="1800" u="none">
-          <a:ln>
-            <a:noFill/>
-          </a:ln>
           <a:solidFill>
             <a:schemeClr val="tx1"/>
           </a:solidFill>
@@ -3033,9 +2961,6 @@
         <a:buNone/>
         <a:tabLst/>
         <a:defRPr b="0" baseline="0" cap="none" i="0" spc="0" strike="noStrike" sz="1800" u="none">
-          <a:ln>
-            <a:noFill/>
-          </a:ln>
           <a:solidFill>
             <a:schemeClr val="tx1"/>
           </a:solidFill>
@@ -3062,9 +2987,6 @@
         <a:buNone/>
         <a:tabLst/>
         <a:defRPr b="0" baseline="0" cap="none" i="0" spc="0" strike="noStrike" sz="1800" u="none">
-          <a:ln>
-            <a:noFill/>
-          </a:ln>
           <a:solidFill>
             <a:schemeClr val="tx1"/>
           </a:solidFill>
@@ -3091,9 +3013,6 @@
         <a:buNone/>
         <a:tabLst/>
         <a:defRPr b="0" baseline="0" cap="none" i="0" spc="0" strike="noStrike" sz="1800" u="none">
-          <a:ln>
-            <a:noFill/>
-          </a:ln>
           <a:solidFill>
             <a:schemeClr val="tx1"/>
           </a:solidFill>
@@ -3145,7 +3064,7 @@
         <p:spPr>
           <a:xfrm>
             <a:off x="3319319" y="1533525"/>
-            <a:ext cx="3548647" cy="4572001"/>
+            <a:ext cx="3548647" cy="4572000"/>
           </a:xfrm>
           <a:prstGeom prst="rect">
             <a:avLst/>
@@ -3213,7 +3132,7 @@
         <p:spPr>
           <a:xfrm>
             <a:off x="7072642" y="1533525"/>
-            <a:ext cx="3570759" cy="4572001"/>
+            <a:ext cx="3570759" cy="4572000"/>
           </a:xfrm>
           <a:prstGeom prst="rect">
             <a:avLst/>
@@ -3620,38 +3539,9 @@
           </a:p>
         </p:txBody>
       </p:sp>
-      <p:pic>
-        <p:nvPicPr>
-          <p:cNvPr id="139" name="Image" descr="Image"/>
-          <p:cNvPicPr>
-            <a:picLocks noChangeAspect="1"/>
-          </p:cNvPicPr>
-          <p:nvPr/>
-        </p:nvPicPr>
-        <p:blipFill>
-          <a:blip r:embed="rId10">
-            <a:extLst/>
-          </a:blip>
-          <a:stretch>
-            <a:fillRect/>
-          </a:stretch>
-        </p:blipFill>
-        <p:spPr>
-          <a:xfrm>
-            <a:off x="11952068" y="136271"/>
-            <a:ext cx="2084548" cy="1455517"/>
-          </a:xfrm>
-          <a:prstGeom prst="rect">
-            <a:avLst/>
-          </a:prstGeom>
-          <a:ln w="12700">
-            <a:miter lim="400000"/>
-          </a:ln>
-        </p:spPr>
-      </p:pic>
       <p:sp>
         <p:nvSpPr>
-          <p:cNvPr id="140" name="Line"/>
+          <p:cNvPr id="139" name="Line"/>
           <p:cNvSpPr/>
           <p:nvPr/>
         </p:nvSpPr>
@@ -3692,14 +3582,14 @@
       </p:sp>
       <p:sp>
         <p:nvSpPr>
-          <p:cNvPr id="141" name="Python in R code"/>
+          <p:cNvPr id="140" name="Python in R"/>
           <p:cNvSpPr txBox="1"/>
           <p:nvPr/>
         </p:nvSpPr>
         <p:spPr>
           <a:xfrm>
             <a:off x="10710398" y="1523999"/>
-            <a:ext cx="2258696" cy="431801"/>
+            <a:ext cx="1551306" cy="431801"/>
           </a:xfrm>
           <a:prstGeom prst="rect">
             <a:avLst/>
@@ -3733,14 +3623,14 @@
               </a:defRPr>
             </a:pPr>
             <a:r>
-              <a:t>Python in R code</a:t>
+              <a:t>Python in R</a:t>
             </a:r>
           </a:p>
         </p:txBody>
       </p:sp>
       <p:sp>
         <p:nvSpPr>
-          <p:cNvPr id="142" name="Call Python from R in three ways:"/>
+          <p:cNvPr id="141" name="Call Python from R code in three ways:"/>
           <p:cNvSpPr txBox="1"/>
           <p:nvPr/>
         </p:nvSpPr>
@@ -3783,21 +3673,21 @@
           <a:p>
             <a:pPr/>
             <a:r>
-              <a:t>Call Python from R in three ways:</a:t>
+              <a:t>Call Python from R code in three ways:</a:t>
             </a:r>
           </a:p>
         </p:txBody>
       </p:sp>
       <p:sp>
         <p:nvSpPr>
-          <p:cNvPr id="143" name="Use import() to import any Python module. Access the attributes of a module with $.…"/>
+          <p:cNvPr id="142" name="Use import() to import any Python module. Access the attributes of a module with $.…"/>
           <p:cNvSpPr txBox="1"/>
           <p:nvPr/>
         </p:nvSpPr>
         <p:spPr>
           <a:xfrm>
-            <a:off x="10742928" y="2476155"/>
-            <a:ext cx="2745181" cy="3196984"/>
+            <a:off x="10742927" y="2476155"/>
+            <a:ext cx="2745182" cy="3196984"/>
           </a:xfrm>
           <a:prstGeom prst="rect">
             <a:avLst/>
@@ -3980,14 +3870,14 @@
       </p:sp>
       <p:sp>
         <p:nvSpPr>
-          <p:cNvPr id="144" name="IMPORT PYTHON MODULES"/>
+          <p:cNvPr id="143" name="IMPORT PYTHON MODULES"/>
           <p:cNvSpPr txBox="1"/>
           <p:nvPr/>
         </p:nvSpPr>
         <p:spPr>
           <a:xfrm>
-            <a:off x="10722338" y="2221166"/>
-            <a:ext cx="1856842" cy="215901"/>
+            <a:off x="10722337" y="2221166"/>
+            <a:ext cx="1856843" cy="215901"/>
           </a:xfrm>
           <a:prstGeom prst="rect">
             <a:avLst/>
@@ -4022,7 +3912,7 @@
       </p:sp>
       <p:sp>
         <p:nvSpPr>
-          <p:cNvPr id="145" name="SOURCE PYTHON FILES"/>
+          <p:cNvPr id="144" name="SOURCE PYTHON FILES"/>
           <p:cNvSpPr txBox="1"/>
           <p:nvPr/>
         </p:nvSpPr>
@@ -4064,7 +3954,7 @@
       </p:sp>
       <p:sp>
         <p:nvSpPr>
-          <p:cNvPr id="146" name="Use source_python() to source a Python script and make the Python functions and objects it creates available in the calling R environment.…"/>
+          <p:cNvPr id="145" name="Use source_python() to source a Python script and make the Python functions and objects it creates available in the calling R environment.…"/>
           <p:cNvSpPr txBox="1"/>
           <p:nvPr/>
         </p:nvSpPr>
@@ -4147,7 +4037,7 @@
       </p:sp>
       <p:sp>
         <p:nvSpPr>
-          <p:cNvPr id="147" name="RUN PYTHON CODE"/>
+          <p:cNvPr id="146" name="RUN PYTHON CODE"/>
           <p:cNvSpPr txBox="1"/>
           <p:nvPr/>
         </p:nvSpPr>
@@ -4189,7 +4079,7 @@
       </p:sp>
       <p:sp>
         <p:nvSpPr>
-          <p:cNvPr id="148" name="Execute Python code into the main Python module with py_run_file() or py_run_string().…"/>
+          <p:cNvPr id="147" name="Execute Python code into the main Python module with py_run_file() or py_run_string().…"/>
           <p:cNvSpPr txBox="1"/>
           <p:nvPr/>
         </p:nvSpPr>
@@ -4502,7 +4392,7 @@
       </p:sp>
       <p:sp>
         <p:nvSpPr>
-          <p:cNvPr id="149" name="The reticulate package lets you use Python and R together seamlessly in R code, in R Markdown documents, and in the RStudio IDE."/>
+          <p:cNvPr id="148" name="The reticulate package lets you use Python and R together seamlessly in R code, in R Markdown documents, and in the RStudio IDE."/>
           <p:cNvSpPr txBox="1"/>
           <p:nvPr/>
         </p:nvSpPr>
@@ -4562,14 +4452,14 @@
       </p:sp>
       <p:sp>
         <p:nvSpPr>
-          <p:cNvPr id="150" name="py_capture_output(expr, type = c(&quot;stdout&quot;, &quot;stderr&quot;)) Capture and return Python output. Also py_suppress_warnings. py_capture_output(&quot;x&quot;)…"/>
+          <p:cNvPr id="149" name="py_capture_output(expr, type = c(&quot;stdout&quot;, &quot;stderr&quot;)) Capture and return Python output. Also py_suppress_warnings. py_capture_output(&quot;x&quot;)…"/>
           <p:cNvSpPr txBox="1"/>
           <p:nvPr/>
         </p:nvSpPr>
         <p:spPr>
           <a:xfrm>
             <a:off x="7225560" y="6837791"/>
-            <a:ext cx="3191505" cy="4184786"/>
+            <a:ext cx="3191504" cy="4184786"/>
           </a:xfrm>
           <a:prstGeom prst="rect">
             <a:avLst/>
@@ -4862,7 +4752,7 @@
       </p:sp>
       <p:graphicFrame>
         <p:nvGraphicFramePr>
-          <p:cNvPr id="151" name="Table"/>
+          <p:cNvPr id="150" name="Table"/>
           <p:cNvGraphicFramePr/>
           <p:nvPr/>
         </p:nvGraphicFramePr>
@@ -5928,7 +5818,7 @@
       </p:graphicFrame>
       <p:sp>
         <p:nvSpPr>
-          <p:cNvPr id="152" name="Line"/>
+          <p:cNvPr id="151" name="Line"/>
           <p:cNvSpPr/>
           <p:nvPr/>
         </p:nvSpPr>
@@ -5969,7 +5859,7 @@
       </p:sp>
       <p:sp>
         <p:nvSpPr>
-          <p:cNvPr id="153" name="py_to_r(x) Convert a Python object to an R object. Also r_to_py.  py_to_r(x)…"/>
+          <p:cNvPr id="152" name="py_to_r(x) Convert a Python object to an R object. Also r_to_py.  py_to_r(x)…"/>
           <p:cNvSpPr txBox="1"/>
           <p:nvPr/>
         </p:nvSpPr>
@@ -6058,7 +5948,7 @@
       </p:sp>
       <p:sp>
         <p:nvSpPr>
-          <p:cNvPr id="154" name="Helpers"/>
+          <p:cNvPr id="153" name="Helpers"/>
           <p:cNvSpPr txBox="1"/>
           <p:nvPr/>
         </p:nvSpPr>
@@ -6106,7 +5996,7 @@
       </p:sp>
       <p:sp>
         <p:nvSpPr>
-          <p:cNvPr id="155" name="Object Conversion"/>
+          <p:cNvPr id="154" name="Object Conversion"/>
           <p:cNvSpPr txBox="1"/>
           <p:nvPr/>
         </p:nvSpPr>
@@ -6154,7 +6044,7 @@
       </p:sp>
       <p:sp>
         <p:nvSpPr>
-          <p:cNvPr id="156" name="dict(..., convert = FALSE) Create a Python dictionary object. Also py_dict to make a dictionary that uses Python objects as keys. dict(foo = &quot;bar&quot;, index = 42L)…"/>
+          <p:cNvPr id="155" name="dict(..., convert = FALSE) Create a Python dictionary object. Also py_dict to make a dictionary that uses Python objects as keys. dict(foo = &quot;bar&quot;, index = 42L)…"/>
           <p:cNvSpPr txBox="1"/>
           <p:nvPr/>
         </p:nvSpPr>
@@ -6393,7 +6283,7 @@
       </p:sp>
       <p:sp>
         <p:nvSpPr>
-          <p:cNvPr id="157" name="Reticulate provides automatic built-in conversion between Python and R for many Python types."/>
+          <p:cNvPr id="156" name="Reticulate provides automatic built-in conversion between Python and R for many Python types."/>
           <p:cNvSpPr txBox="1"/>
           <p:nvPr/>
         </p:nvSpPr>
@@ -6453,14 +6343,14 @@
       </p:sp>
       <p:sp>
         <p:nvSpPr>
-          <p:cNvPr id="158" name="Double Arrow"/>
+          <p:cNvPr id="157" name="Double Arrow"/>
           <p:cNvSpPr/>
           <p:nvPr/>
         </p:nvSpPr>
         <p:spPr>
           <a:xfrm>
             <a:off x="1757567" y="7270476"/>
-            <a:ext cx="392398" cy="168527"/>
+            <a:ext cx="392399" cy="168527"/>
           </a:xfrm>
           <a:prstGeom prst="leftRightArrow">
             <a:avLst>
@@ -6497,7 +6387,7 @@
       </p:sp>
       <p:sp>
         <p:nvSpPr>
-          <p:cNvPr id="159" name="Tip: To index Python objects begin at 0, use integers, e.g. 0L"/>
+          <p:cNvPr id="158" name="Tip: To index Python objects begin at 0, use integers, e.g. 0L"/>
           <p:cNvSpPr txBox="1"/>
           <p:nvPr/>
         </p:nvSpPr>
@@ -6551,7 +6441,7 @@
       </p:sp>
       <p:sp>
         <p:nvSpPr>
-          <p:cNvPr id="160" name="Or, if you like, you can convert manually with"/>
+          <p:cNvPr id="159" name="Or, if you like, you can convert manually with"/>
           <p:cNvSpPr txBox="1"/>
           <p:nvPr/>
         </p:nvSpPr>
@@ -6601,7 +6491,7 @@
       </p:sp>
       <p:sp>
         <p:nvSpPr>
-          <p:cNvPr id="161" name="(Optional) Build Python env to use.…"/>
+          <p:cNvPr id="160" name="(Optional) Build Python env to use.…"/>
           <p:cNvSpPr txBox="1"/>
           <p:nvPr/>
         </p:nvSpPr>
@@ -6898,14 +6788,14 @@
       </p:sp>
       <p:sp>
         <p:nvSpPr>
-          <p:cNvPr id="162" name="Line"/>
+          <p:cNvPr id="161" name="Line"/>
           <p:cNvSpPr/>
           <p:nvPr/>
         </p:nvSpPr>
         <p:spPr>
           <a:xfrm flipH="1">
-            <a:off x="2342487" y="2647556"/>
-            <a:ext cx="1347005" cy="526807"/>
+            <a:off x="2342486" y="2647556"/>
+            <a:ext cx="1347006" cy="526807"/>
           </a:xfrm>
           <a:prstGeom prst="line">
             <a:avLst/>
@@ -6942,7 +6832,7 @@
       </p:sp>
       <p:sp>
         <p:nvSpPr>
-          <p:cNvPr id="163" name="Line"/>
+          <p:cNvPr id="162" name="Line"/>
           <p:cNvSpPr/>
           <p:nvPr/>
         </p:nvSpPr>
@@ -6986,7 +6876,7 @@
       </p:sp>
       <p:sp>
         <p:nvSpPr>
-          <p:cNvPr id="164" name="Line"/>
+          <p:cNvPr id="163" name="Line"/>
           <p:cNvSpPr/>
           <p:nvPr/>
         </p:nvSpPr>
@@ -7030,7 +6920,7 @@
       </p:sp>
       <p:sp>
         <p:nvSpPr>
-          <p:cNvPr id="165" name="Oval"/>
+          <p:cNvPr id="164" name="Oval"/>
           <p:cNvSpPr/>
           <p:nvPr/>
         </p:nvSpPr>
@@ -7073,14 +6963,14 @@
       </p:sp>
       <p:sp>
         <p:nvSpPr>
-          <p:cNvPr id="166" name="Line"/>
+          <p:cNvPr id="165" name="Line"/>
           <p:cNvSpPr/>
           <p:nvPr/>
         </p:nvSpPr>
         <p:spPr>
           <a:xfrm flipH="1">
             <a:off x="2892283" y="4108435"/>
-            <a:ext cx="1664852" cy="197272"/>
+            <a:ext cx="1664852" cy="197271"/>
           </a:xfrm>
           <a:prstGeom prst="line">
             <a:avLst/>
@@ -7117,7 +7007,7 @@
       </p:sp>
       <p:sp>
         <p:nvSpPr>
-          <p:cNvPr id="167" name="Oval"/>
+          <p:cNvPr id="166" name="Oval"/>
           <p:cNvSpPr/>
           <p:nvPr/>
         </p:nvSpPr>
@@ -7160,7 +7050,7 @@
       </p:sp>
       <p:sp>
         <p:nvSpPr>
-          <p:cNvPr id="168" name="Line"/>
+          <p:cNvPr id="167" name="Line"/>
           <p:cNvSpPr/>
           <p:nvPr/>
         </p:nvSpPr>
@@ -7204,7 +7094,7 @@
       </p:sp>
       <p:sp>
         <p:nvSpPr>
-          <p:cNvPr id="169" name="Oval"/>
+          <p:cNvPr id="168" name="Oval"/>
           <p:cNvSpPr/>
           <p:nvPr/>
         </p:nvSpPr>
@@ -7247,7 +7137,7 @@
       </p:sp>
       <p:sp>
         <p:nvSpPr>
-          <p:cNvPr id="170" name="Line"/>
+          <p:cNvPr id="169" name="Line"/>
           <p:cNvSpPr/>
           <p:nvPr/>
         </p:nvSpPr>
@@ -7291,14 +7181,14 @@
       </p:sp>
       <p:sp>
         <p:nvSpPr>
-          <p:cNvPr id="171" name="Line"/>
+          <p:cNvPr id="170" name="Line"/>
           <p:cNvSpPr/>
           <p:nvPr/>
         </p:nvSpPr>
         <p:spPr>
           <a:xfrm flipH="1">
-            <a:off x="9487505" y="2568354"/>
-            <a:ext cx="1247053" cy="155057"/>
+            <a:off x="9487505" y="2568353"/>
+            <a:ext cx="1247052" cy="155058"/>
           </a:xfrm>
           <a:prstGeom prst="line">
             <a:avLst/>
@@ -7335,14 +7225,14 @@
       </p:sp>
       <p:sp>
         <p:nvSpPr>
-          <p:cNvPr id="172" name="Oval"/>
+          <p:cNvPr id="171" name="Oval"/>
           <p:cNvSpPr/>
           <p:nvPr/>
         </p:nvSpPr>
         <p:spPr>
           <a:xfrm>
-            <a:off x="8066020" y="2997020"/>
-            <a:ext cx="460862" cy="239316"/>
+            <a:off x="8066020" y="2997019"/>
+            <a:ext cx="460862" cy="239317"/>
           </a:xfrm>
           <a:prstGeom prst="ellipse">
             <a:avLst/>
@@ -7378,7 +7268,7 @@
       </p:sp>
       <p:sp>
         <p:nvSpPr>
-          <p:cNvPr id="173" name="Line"/>
+          <p:cNvPr id="172" name="Line"/>
           <p:cNvSpPr/>
           <p:nvPr/>
         </p:nvSpPr>
@@ -7422,7 +7312,7 @@
       </p:sp>
       <p:sp>
         <p:nvSpPr>
-          <p:cNvPr id="174" name="Line"/>
+          <p:cNvPr id="173" name="Line"/>
           <p:cNvSpPr/>
           <p:nvPr/>
         </p:nvSpPr>
@@ -7466,14 +7356,14 @@
       </p:sp>
       <p:sp>
         <p:nvSpPr>
-          <p:cNvPr id="175" name="Line"/>
+          <p:cNvPr id="174" name="Line"/>
           <p:cNvSpPr/>
           <p:nvPr/>
         </p:nvSpPr>
         <p:spPr>
           <a:xfrm flipH="1" flipV="1">
             <a:off x="8558969" y="4742540"/>
-            <a:ext cx="2156634" cy="2393714"/>
+            <a:ext cx="2156635" cy="2393714"/>
           </a:xfrm>
           <a:prstGeom prst="line">
             <a:avLst/>
@@ -7510,14 +7400,14 @@
       </p:sp>
       <p:sp>
         <p:nvSpPr>
-          <p:cNvPr id="176" name="Oval"/>
+          <p:cNvPr id="175" name="Oval"/>
           <p:cNvSpPr/>
           <p:nvPr/>
         </p:nvSpPr>
         <p:spPr>
           <a:xfrm>
-            <a:off x="7719186" y="4714100"/>
-            <a:ext cx="460862" cy="286112"/>
+            <a:off x="7719186" y="4714101"/>
+            <a:ext cx="460862" cy="286111"/>
           </a:xfrm>
           <a:prstGeom prst="ellipse">
             <a:avLst/>
@@ -7553,7 +7443,7 @@
       </p:sp>
       <p:sp>
         <p:nvSpPr>
-          <p:cNvPr id="177" name="Line"/>
+          <p:cNvPr id="176" name="Line"/>
           <p:cNvSpPr/>
           <p:nvPr/>
         </p:nvSpPr>
@@ -7597,12 +7487,12 @@
       </p:sp>
       <p:sp>
         <p:nvSpPr>
-          <p:cNvPr id="178" name="Line"/>
+          <p:cNvPr id="177" name="Line"/>
           <p:cNvSpPr/>
           <p:nvPr/>
         </p:nvSpPr>
         <p:spPr>
-          <a:xfrm flipV="1">
+          <a:xfrm flipH="1" flipV="1">
             <a:off x="3715615" y="2250513"/>
             <a:ext cx="1" cy="271507"/>
           </a:xfrm>
@@ -7641,14 +7531,14 @@
       </p:sp>
       <p:sp>
         <p:nvSpPr>
-          <p:cNvPr id="179" name="Oval"/>
+          <p:cNvPr id="178" name="Oval"/>
           <p:cNvSpPr/>
           <p:nvPr/>
         </p:nvSpPr>
         <p:spPr>
           <a:xfrm>
-            <a:off x="3704005" y="4748719"/>
-            <a:ext cx="287958" cy="216874"/>
+            <a:off x="3704004" y="4748719"/>
+            <a:ext cx="287959" cy="216875"/>
           </a:xfrm>
           <a:prstGeom prst="ellipse">
             <a:avLst/>
@@ -7684,7 +7574,7 @@
       </p:sp>
       <p:sp>
         <p:nvSpPr>
-          <p:cNvPr id="180" name="Line"/>
+          <p:cNvPr id="179" name="Line"/>
           <p:cNvSpPr/>
           <p:nvPr/>
         </p:nvSpPr>
@@ -7726,6 +7616,35 @@
           </a:p>
         </p:txBody>
       </p:sp>
+      <p:pic>
+        <p:nvPicPr>
+          <p:cNvPr id="180" name="reticulate.png" descr="reticulate.png"/>
+          <p:cNvPicPr>
+            <a:picLocks noChangeAspect="1"/>
+          </p:cNvPicPr>
+          <p:nvPr/>
+        </p:nvPicPr>
+        <p:blipFill>
+          <a:blip r:embed="rId10">
+            <a:extLst/>
+          </a:blip>
+          <a:stretch>
+            <a:fillRect/>
+          </a:stretch>
+        </p:blipFill>
+        <p:spPr>
+          <a:xfrm>
+            <a:off x="12287758" y="217925"/>
+            <a:ext cx="1358901" cy="1575216"/>
+          </a:xfrm>
+          <a:prstGeom prst="rect">
+            <a:avLst/>
+          </a:prstGeom>
+          <a:ln w="12700">
+            <a:miter lim="400000"/>
+          </a:ln>
+        </p:spPr>
+      </p:pic>
     </p:spTree>
   </p:cSld>
   <p:clrMapOvr>
@@ -9063,9 +8982,787 @@
           </a:p>
         </p:txBody>
       </p:sp>
+      <p:sp>
+        <p:nvSpPr>
+          <p:cNvPr id="202" name="Python in the IDE"/>
+          <p:cNvSpPr txBox="1"/>
+          <p:nvPr/>
+        </p:nvSpPr>
+        <p:spPr>
+          <a:xfrm>
+            <a:off x="316389" y="723899"/>
+            <a:ext cx="2317751" cy="431801"/>
+          </a:xfrm>
+          <a:prstGeom prst="rect">
+            <a:avLst/>
+          </a:prstGeom>
+          <a:ln w="12700">
+            <a:miter lim="400000"/>
+          </a:ln>
+          <a:extLst>
+            <a:ext uri="{C572A759-6A51-4108-AA02-DFA0A04FC94B}">
+              <ma14:wrappingTextBoxFlag xmlns:ma14="http://schemas.microsoft.com/office/mac/drawingml/2011/main" val="1"/>
+            </a:ext>
+          </a:extLst>
+        </p:spPr>
+        <p:txBody>
+          <a:bodyPr wrap="none" lIns="12700" tIns="12700" rIns="12700" bIns="12700" anchor="ctr">
+            <a:spAutoFit/>
+          </a:bodyPr>
+          <a:lstStyle/>
+          <a:p>
+            <a:pPr lvl="1" indent="0">
+              <a:lnSpc>
+                <a:spcPct val="80000"/>
+              </a:lnSpc>
+              <a:spcBef>
+                <a:spcPts val="0"/>
+              </a:spcBef>
+              <a:defRPr b="0" sz="2500">
+                <a:solidFill>
+                  <a:srgbClr val="654F25"/>
+                </a:solidFill>
+              </a:defRPr>
+            </a:pPr>
+            <a:r>
+              <a:t>Python in the IDE</a:t>
+            </a:r>
+          </a:p>
+        </p:txBody>
+      </p:sp>
+      <p:sp>
+        <p:nvSpPr>
+          <p:cNvPr id="203" name="Requires reticulate plus RStudio v1.2 or higher."/>
+          <p:cNvSpPr txBox="1"/>
+          <p:nvPr/>
+        </p:nvSpPr>
+        <p:spPr>
+          <a:xfrm>
+            <a:off x="2706170" y="927715"/>
+            <a:ext cx="3311341" cy="235572"/>
+          </a:xfrm>
+          <a:prstGeom prst="rect">
+            <a:avLst/>
+          </a:prstGeom>
+          <a:ln w="12700">
+            <a:miter lim="400000"/>
+          </a:ln>
+          <a:extLst>
+            <a:ext uri="{C572A759-6A51-4108-AA02-DFA0A04FC94B}">
+              <ma14:wrappingTextBoxFlag xmlns:ma14="http://schemas.microsoft.com/office/mac/drawingml/2011/main" val="1"/>
+            </a:ext>
+          </a:extLst>
+        </p:spPr>
+        <p:txBody>
+          <a:bodyPr lIns="0" tIns="0" rIns="0" bIns="0">
+            <a:normAutofit fontScale="100000" lnSpcReduction="0"/>
+          </a:bodyPr>
+          <a:lstStyle>
+            <a:lvl1pPr>
+              <a:lnSpc>
+                <a:spcPct val="80000"/>
+              </a:lnSpc>
+              <a:spcBef>
+                <a:spcPts val="1000"/>
+              </a:spcBef>
+              <a:defRPr b="0" sz="1100">
+                <a:solidFill>
+                  <a:srgbClr val="000000"/>
+                </a:solidFill>
+              </a:defRPr>
+            </a:lvl1pPr>
+          </a:lstStyle>
+          <a:p>
+            <a:pPr/>
+            <a:r>
+              <a:t>Requires reticulate plus RStudio v1.2 or higher.</a:t>
+            </a:r>
+          </a:p>
+        </p:txBody>
+      </p:sp>
+      <p:sp>
+        <p:nvSpPr>
+          <p:cNvPr id="204" name="matplotlib plots display in plots pane."/>
+          <p:cNvSpPr txBox="1"/>
+          <p:nvPr/>
+        </p:nvSpPr>
+        <p:spPr>
+          <a:xfrm>
+            <a:off x="6048999" y="1174839"/>
+            <a:ext cx="847877" cy="616477"/>
+          </a:xfrm>
+          <a:prstGeom prst="rect">
+            <a:avLst/>
+          </a:prstGeom>
+          <a:ln w="12700">
+            <a:miter lim="400000"/>
+          </a:ln>
+          <a:extLst>
+            <a:ext uri="{C572A759-6A51-4108-AA02-DFA0A04FC94B}">
+              <ma14:wrappingTextBoxFlag xmlns:ma14="http://schemas.microsoft.com/office/mac/drawingml/2011/main" val="1"/>
+            </a:ext>
+          </a:extLst>
+        </p:spPr>
+        <p:txBody>
+          <a:bodyPr lIns="0" tIns="0" rIns="0" bIns="0">
+            <a:normAutofit fontScale="100000" lnSpcReduction="0"/>
+          </a:bodyPr>
+          <a:lstStyle>
+            <a:lvl1pPr>
+              <a:lnSpc>
+                <a:spcPct val="80000"/>
+              </a:lnSpc>
+              <a:spcBef>
+                <a:spcPts val="1000"/>
+              </a:spcBef>
+              <a:defRPr b="0" sz="1100">
+                <a:solidFill>
+                  <a:srgbClr val="000000"/>
+                </a:solidFill>
+              </a:defRPr>
+            </a:lvl1pPr>
+          </a:lstStyle>
+          <a:p>
+            <a:pPr/>
+            <a:r>
+              <a:t>matplotlib plots display in plots pane.</a:t>
+            </a:r>
+          </a:p>
+        </p:txBody>
+      </p:sp>
+      <p:sp>
+        <p:nvSpPr>
+          <p:cNvPr id="205" name="Execute Python code line by line with Cmd +  Enter (Ctrl + Enter)"/>
+          <p:cNvSpPr txBox="1"/>
+          <p:nvPr/>
+        </p:nvSpPr>
+        <p:spPr>
+          <a:xfrm>
+            <a:off x="3772902" y="1163873"/>
+            <a:ext cx="1104512" cy="616477"/>
+          </a:xfrm>
+          <a:prstGeom prst="rect">
+            <a:avLst/>
+          </a:prstGeom>
+          <a:ln w="12700">
+            <a:miter lim="400000"/>
+          </a:ln>
+          <a:extLst>
+            <a:ext uri="{C572A759-6A51-4108-AA02-DFA0A04FC94B}">
+              <ma14:wrappingTextBoxFlag xmlns:ma14="http://schemas.microsoft.com/office/mac/drawingml/2011/main" val="1"/>
+            </a:ext>
+          </a:extLst>
+        </p:spPr>
+        <p:txBody>
+          <a:bodyPr lIns="0" tIns="0" rIns="0" bIns="0">
+            <a:normAutofit fontScale="100000" lnSpcReduction="0"/>
+          </a:bodyPr>
+          <a:lstStyle/>
+          <a:p>
+            <a:pPr>
+              <a:lnSpc>
+                <a:spcPct val="80000"/>
+              </a:lnSpc>
+              <a:spcBef>
+                <a:spcPts val="1000"/>
+              </a:spcBef>
+              <a:defRPr b="0" sz="1100">
+                <a:solidFill>
+                  <a:srgbClr val="000000"/>
+                </a:solidFill>
+              </a:defRPr>
+            </a:pPr>
+            <a:r>
+              <a:t>Execute Python code line by line with </a:t>
+            </a:r>
+            <a:r>
+              <a:rPr>
+                <a:latin typeface="Source Sans Pro Semibold"/>
+                <a:ea typeface="Source Sans Pro Semibold"/>
+                <a:cs typeface="Source Sans Pro Semibold"/>
+                <a:sym typeface="Source Sans Pro Semibold"/>
+              </a:rPr>
+              <a:t>Cmd +  Enter</a:t>
+            </a:r>
+            <a:r>
+              <a:t> (</a:t>
+            </a:r>
+            <a:r>
+              <a:rPr>
+                <a:latin typeface="Source Sans Pro Semibold"/>
+                <a:ea typeface="Source Sans Pro Semibold"/>
+                <a:cs typeface="Source Sans Pro Semibold"/>
+                <a:sym typeface="Source Sans Pro Semibold"/>
+              </a:rPr>
+              <a:t>Ctrl + Enter</a:t>
+            </a:r>
+            <a:r>
+              <a:t>)</a:t>
+            </a:r>
+          </a:p>
+        </p:txBody>
+      </p:sp>
+      <p:sp>
+        <p:nvSpPr>
+          <p:cNvPr id="206" name="Source Python scripts."/>
+          <p:cNvSpPr txBox="1"/>
+          <p:nvPr/>
+        </p:nvSpPr>
+        <p:spPr>
+          <a:xfrm>
+            <a:off x="3151066" y="1174839"/>
+            <a:ext cx="506588" cy="573091"/>
+          </a:xfrm>
+          <a:prstGeom prst="rect">
+            <a:avLst/>
+          </a:prstGeom>
+          <a:ln w="12700">
+            <a:miter lim="400000"/>
+          </a:ln>
+          <a:extLst>
+            <a:ext uri="{C572A759-6A51-4108-AA02-DFA0A04FC94B}">
+              <ma14:wrappingTextBoxFlag xmlns:ma14="http://schemas.microsoft.com/office/mac/drawingml/2011/main" val="1"/>
+            </a:ext>
+          </a:extLst>
+        </p:spPr>
+        <p:txBody>
+          <a:bodyPr lIns="0" tIns="0" rIns="0" bIns="0">
+            <a:normAutofit fontScale="100000" lnSpcReduction="0"/>
+          </a:bodyPr>
+          <a:lstStyle>
+            <a:lvl1pPr>
+              <a:lnSpc>
+                <a:spcPct val="80000"/>
+              </a:lnSpc>
+              <a:spcBef>
+                <a:spcPts val="1000"/>
+              </a:spcBef>
+              <a:defRPr b="0" sz="1100">
+                <a:solidFill>
+                  <a:srgbClr val="000000"/>
+                </a:solidFill>
+              </a:defRPr>
+            </a:lvl1pPr>
+          </a:lstStyle>
+          <a:p>
+            <a:pPr/>
+            <a:r>
+              <a:t>Source Python scripts.</a:t>
+            </a:r>
+          </a:p>
+        </p:txBody>
+      </p:sp>
+      <p:sp>
+        <p:nvSpPr>
+          <p:cNvPr id="207" name="Syntax highlighting for Python scripts and chunks"/>
+          <p:cNvSpPr txBox="1"/>
+          <p:nvPr/>
+        </p:nvSpPr>
+        <p:spPr>
+          <a:xfrm>
+            <a:off x="313325" y="1177399"/>
+            <a:ext cx="1016404" cy="614825"/>
+          </a:xfrm>
+          <a:prstGeom prst="rect">
+            <a:avLst/>
+          </a:prstGeom>
+          <a:ln w="12700">
+            <a:miter lim="400000"/>
+          </a:ln>
+          <a:extLst>
+            <a:ext uri="{C572A759-6A51-4108-AA02-DFA0A04FC94B}">
+              <ma14:wrappingTextBoxFlag xmlns:ma14="http://schemas.microsoft.com/office/mac/drawingml/2011/main" val="1"/>
+            </a:ext>
+          </a:extLst>
+        </p:spPr>
+        <p:txBody>
+          <a:bodyPr lIns="0" tIns="0" rIns="0" bIns="0">
+            <a:normAutofit fontScale="100000" lnSpcReduction="0"/>
+          </a:bodyPr>
+          <a:lstStyle>
+            <a:lvl1pPr>
+              <a:lnSpc>
+                <a:spcPct val="80000"/>
+              </a:lnSpc>
+              <a:spcBef>
+                <a:spcPts val="1000"/>
+              </a:spcBef>
+              <a:defRPr b="0" sz="1100">
+                <a:solidFill>
+                  <a:srgbClr val="000000"/>
+                </a:solidFill>
+              </a:defRPr>
+            </a:lvl1pPr>
+          </a:lstStyle>
+          <a:p>
+            <a:pPr/>
+            <a:r>
+              <a:t>Syntax highlighting for Python scripts and chunks</a:t>
+            </a:r>
+          </a:p>
+        </p:txBody>
+      </p:sp>
+      <p:sp>
+        <p:nvSpPr>
+          <p:cNvPr id="208" name="Press F1 over a Python symbol to display the help topic for that symbol."/>
+          <p:cNvSpPr txBox="1"/>
+          <p:nvPr/>
+        </p:nvSpPr>
+        <p:spPr>
+          <a:xfrm>
+            <a:off x="4999567" y="1174839"/>
+            <a:ext cx="990779" cy="860426"/>
+          </a:xfrm>
+          <a:prstGeom prst="rect">
+            <a:avLst/>
+          </a:prstGeom>
+          <a:ln w="12700">
+            <a:miter lim="400000"/>
+          </a:ln>
+          <a:extLst>
+            <a:ext uri="{C572A759-6A51-4108-AA02-DFA0A04FC94B}">
+              <ma14:wrappingTextBoxFlag xmlns:ma14="http://schemas.microsoft.com/office/mac/drawingml/2011/main" val="1"/>
+            </a:ext>
+          </a:extLst>
+        </p:spPr>
+        <p:txBody>
+          <a:bodyPr lIns="0" tIns="0" rIns="0" bIns="0">
+            <a:normAutofit fontScale="100000" lnSpcReduction="0"/>
+          </a:bodyPr>
+          <a:lstStyle/>
+          <a:p>
+            <a:pPr>
+              <a:lnSpc>
+                <a:spcPct val="80000"/>
+              </a:lnSpc>
+              <a:spcBef>
+                <a:spcPts val="1000"/>
+              </a:spcBef>
+              <a:defRPr b="0" sz="1100">
+                <a:solidFill>
+                  <a:srgbClr val="000000"/>
+                </a:solidFill>
+              </a:defRPr>
+            </a:pPr>
+            <a:r>
+              <a:t>Press </a:t>
+            </a:r>
+            <a:r>
+              <a:rPr>
+                <a:latin typeface="Source Sans Pro Semibold"/>
+                <a:ea typeface="Source Sans Pro Semibold"/>
+                <a:cs typeface="Source Sans Pro Semibold"/>
+                <a:sym typeface="Source Sans Pro Semibold"/>
+              </a:rPr>
+              <a:t>F1</a:t>
+            </a:r>
+            <a:r>
+              <a:t> over a Python symbol to display the help topic for that symbol.</a:t>
+            </a:r>
+          </a:p>
+        </p:txBody>
+      </p:sp>
+      <p:sp>
+        <p:nvSpPr>
+          <p:cNvPr id="209" name="Tab completion for Python functions and objects (and Python modules imported in R scripts)"/>
+          <p:cNvSpPr txBox="1"/>
+          <p:nvPr/>
+        </p:nvSpPr>
+        <p:spPr>
+          <a:xfrm>
+            <a:off x="1382076" y="1174839"/>
+            <a:ext cx="1564022" cy="616477"/>
+          </a:xfrm>
+          <a:prstGeom prst="rect">
+            <a:avLst/>
+          </a:prstGeom>
+          <a:ln w="12700">
+            <a:miter lim="400000"/>
+          </a:ln>
+          <a:extLst>
+            <a:ext uri="{C572A759-6A51-4108-AA02-DFA0A04FC94B}">
+              <ma14:wrappingTextBoxFlag xmlns:ma14="http://schemas.microsoft.com/office/mac/drawingml/2011/main" val="1"/>
+            </a:ext>
+          </a:extLst>
+        </p:spPr>
+        <p:txBody>
+          <a:bodyPr lIns="0" tIns="0" rIns="0" bIns="0">
+            <a:normAutofit fontScale="100000" lnSpcReduction="0"/>
+          </a:bodyPr>
+          <a:lstStyle>
+            <a:lvl1pPr>
+              <a:lnSpc>
+                <a:spcPct val="80000"/>
+              </a:lnSpc>
+              <a:spcBef>
+                <a:spcPts val="1000"/>
+              </a:spcBef>
+              <a:defRPr b="0" sz="1100">
+                <a:solidFill>
+                  <a:srgbClr val="000000"/>
+                </a:solidFill>
+              </a:defRPr>
+            </a:lvl1pPr>
+          </a:lstStyle>
+          <a:p>
+            <a:pPr/>
+            <a:r>
+              <a:t>Tab completion for Python functions and objects (and Python modules imported in R scripts)</a:t>
+            </a:r>
+          </a:p>
+        </p:txBody>
+      </p:sp>
+      <p:sp>
+        <p:nvSpPr>
+          <p:cNvPr id="210" name="Line"/>
+          <p:cNvSpPr/>
+          <p:nvPr/>
+        </p:nvSpPr>
+        <p:spPr>
+          <a:xfrm>
+            <a:off x="7115337" y="723900"/>
+            <a:ext cx="4239786" cy="0"/>
+          </a:xfrm>
+          <a:prstGeom prst="line">
+            <a:avLst/>
+          </a:prstGeom>
+          <a:ln w="6350">
+            <a:solidFill>
+              <a:srgbClr val="767C85"/>
+            </a:solidFill>
+            <a:miter lim="400000"/>
+          </a:ln>
+        </p:spPr>
+        <p:txBody>
+          <a:bodyPr lIns="54570" tIns="54570" rIns="54570" bIns="54570" anchor="ctr"/>
+          <a:lstStyle/>
+          <a:p>
+            <a:pPr>
+              <a:lnSpc>
+                <a:spcPct val="80000"/>
+              </a:lnSpc>
+              <a:spcBef>
+                <a:spcPts val="600"/>
+              </a:spcBef>
+              <a:defRPr b="0">
+                <a:solidFill>
+                  <a:srgbClr val="000000"/>
+                </a:solidFill>
+              </a:defRPr>
+            </a:pPr>
+          </a:p>
+        </p:txBody>
+      </p:sp>
+      <p:sp>
+        <p:nvSpPr>
+          <p:cNvPr id="211" name="Line"/>
+          <p:cNvSpPr/>
+          <p:nvPr/>
+        </p:nvSpPr>
+        <p:spPr>
+          <a:xfrm>
+            <a:off x="320653" y="6836788"/>
+            <a:ext cx="2670138" cy="1"/>
+          </a:xfrm>
+          <a:prstGeom prst="line">
+            <a:avLst/>
+          </a:prstGeom>
+          <a:ln w="6350">
+            <a:solidFill>
+              <a:srgbClr val="767C85"/>
+            </a:solidFill>
+            <a:miter lim="400000"/>
+          </a:ln>
+        </p:spPr>
+        <p:txBody>
+          <a:bodyPr lIns="54570" tIns="54570" rIns="54570" bIns="54570" anchor="ctr"/>
+          <a:lstStyle/>
+          <a:p>
+            <a:pPr>
+              <a:lnSpc>
+                <a:spcPct val="80000"/>
+              </a:lnSpc>
+              <a:spcBef>
+                <a:spcPts val="600"/>
+              </a:spcBef>
+              <a:defRPr b="0">
+                <a:solidFill>
+                  <a:srgbClr val="000000"/>
+                </a:solidFill>
+              </a:defRPr>
+            </a:pPr>
+          </a:p>
+        </p:txBody>
+      </p:sp>
+      <p:sp>
+        <p:nvSpPr>
+          <p:cNvPr id="212" name="Python REPL"/>
+          <p:cNvSpPr txBox="1"/>
+          <p:nvPr/>
+        </p:nvSpPr>
+        <p:spPr>
+          <a:xfrm>
+            <a:off x="317810" y="6824088"/>
+            <a:ext cx="1737361" cy="431801"/>
+          </a:xfrm>
+          <a:prstGeom prst="rect">
+            <a:avLst/>
+          </a:prstGeom>
+          <a:ln w="12700">
+            <a:miter lim="400000"/>
+          </a:ln>
+          <a:extLst>
+            <a:ext uri="{C572A759-6A51-4108-AA02-DFA0A04FC94B}">
+              <ma14:wrappingTextBoxFlag xmlns:ma14="http://schemas.microsoft.com/office/mac/drawingml/2011/main" val="1"/>
+            </a:ext>
+          </a:extLst>
+        </p:spPr>
+        <p:txBody>
+          <a:bodyPr wrap="none" lIns="12700" tIns="12700" rIns="12700" bIns="12700" anchor="ctr">
+            <a:spAutoFit/>
+          </a:bodyPr>
+          <a:lstStyle/>
+          <a:p>
+            <a:pPr lvl="1" indent="0">
+              <a:lnSpc>
+                <a:spcPct val="80000"/>
+              </a:lnSpc>
+              <a:spcBef>
+                <a:spcPts val="0"/>
+              </a:spcBef>
+              <a:defRPr b="0" sz="2500">
+                <a:solidFill>
+                  <a:srgbClr val="654F25"/>
+                </a:solidFill>
+              </a:defRPr>
+            </a:pPr>
+            <a:r>
+              <a:t>Python REPL</a:t>
+            </a:r>
+          </a:p>
+        </p:txBody>
+      </p:sp>
+      <p:sp>
+        <p:nvSpPr>
+          <p:cNvPr id="213" name="Install Packages"/>
+          <p:cNvSpPr txBox="1"/>
+          <p:nvPr/>
+        </p:nvSpPr>
+        <p:spPr>
+          <a:xfrm>
+            <a:off x="7207322" y="5256577"/>
+            <a:ext cx="2138999" cy="431801"/>
+          </a:xfrm>
+          <a:prstGeom prst="rect">
+            <a:avLst/>
+          </a:prstGeom>
+          <a:ln w="12700">
+            <a:miter lim="400000"/>
+          </a:ln>
+          <a:extLst>
+            <a:ext uri="{C572A759-6A51-4108-AA02-DFA0A04FC94B}">
+              <ma14:wrappingTextBoxFlag xmlns:ma14="http://schemas.microsoft.com/office/mac/drawingml/2011/main" val="1"/>
+            </a:ext>
+          </a:extLst>
+        </p:spPr>
+        <p:txBody>
+          <a:bodyPr wrap="none" lIns="12700" tIns="12700" rIns="12700" bIns="12700" anchor="ctr">
+            <a:spAutoFit/>
+          </a:bodyPr>
+          <a:lstStyle/>
+          <a:p>
+            <a:pPr lvl="1" indent="0">
+              <a:lnSpc>
+                <a:spcPct val="80000"/>
+              </a:lnSpc>
+              <a:spcBef>
+                <a:spcPts val="0"/>
+              </a:spcBef>
+              <a:defRPr b="0" sz="2500">
+                <a:solidFill>
+                  <a:srgbClr val="654F25"/>
+                </a:solidFill>
+              </a:defRPr>
+            </a:pPr>
+            <a:r>
+              <a:t>Install Packages</a:t>
+            </a:r>
+          </a:p>
+        </p:txBody>
+      </p:sp>
+      <p:sp>
+        <p:nvSpPr>
+          <p:cNvPr id="214" name="py_discover_config() Return all detected versions of Python. Use py_config to check which version has been loaded. py_config()…"/>
+          <p:cNvSpPr txBox="1"/>
+          <p:nvPr/>
+        </p:nvSpPr>
+        <p:spPr>
+          <a:xfrm>
+            <a:off x="7178505" y="2140720"/>
+            <a:ext cx="3247891" cy="1271794"/>
+          </a:xfrm>
+          <a:prstGeom prst="rect">
+            <a:avLst/>
+          </a:prstGeom>
+          <a:ln w="12700">
+            <a:miter lim="400000"/>
+          </a:ln>
+          <a:extLst>
+            <a:ext uri="{C572A759-6A51-4108-AA02-DFA0A04FC94B}">
+              <ma14:wrappingTextBoxFlag xmlns:ma14="http://schemas.microsoft.com/office/mac/drawingml/2011/main" val="1"/>
+            </a:ext>
+          </a:extLst>
+        </p:spPr>
+        <p:txBody>
+          <a:bodyPr lIns="0" tIns="0" rIns="0" bIns="0">
+            <a:normAutofit fontScale="100000" lnSpcReduction="0"/>
+          </a:bodyPr>
+          <a:lstStyle/>
+          <a:p>
+            <a:pPr marL="381000" indent="-127000">
+              <a:lnSpc>
+                <a:spcPct val="80000"/>
+              </a:lnSpc>
+              <a:spcBef>
+                <a:spcPts val="1000"/>
+              </a:spcBef>
+              <a:buSzPct val="100000"/>
+              <a:buChar char="•"/>
+              <a:defRPr b="0" sz="1100">
+                <a:solidFill>
+                  <a:srgbClr val="000000"/>
+                </a:solidFill>
+              </a:defRPr>
+            </a:pPr>
+            <a:r>
+              <a:rPr b="1"/>
+              <a:t>py_discover_config</a:t>
+            </a:r>
+            <a:r>
+              <a:t>() Return all detected versions of Python. Use </a:t>
+            </a:r>
+            <a:r>
+              <a:rPr b="1"/>
+              <a:t>py_config</a:t>
+            </a:r>
+            <a:r>
+              <a:t> to check which version has been loaded. </a:t>
+            </a:r>
+            <a:r>
+              <a:rPr i="1"/>
+              <a:t>py_config()</a:t>
+            </a:r>
+            <a:endParaRPr i="1"/>
+          </a:p>
+          <a:p>
+            <a:pPr marL="381000" indent="-127000">
+              <a:lnSpc>
+                <a:spcPct val="80000"/>
+              </a:lnSpc>
+              <a:spcBef>
+                <a:spcPts val="0"/>
+              </a:spcBef>
+              <a:buSzPct val="100000"/>
+              <a:buChar char="•"/>
+              <a:defRPr b="0" sz="1100">
+                <a:solidFill>
+                  <a:srgbClr val="000000"/>
+                </a:solidFill>
+              </a:defRPr>
+            </a:pPr>
+            <a:r>
+              <a:rPr b="1"/>
+              <a:t>py_available</a:t>
+            </a:r>
+            <a:r>
+              <a:t>(initialize = FALSE) Check if </a:t>
+            </a:r>
+          </a:p>
+          <a:p>
+            <a:pPr indent="254000">
+              <a:lnSpc>
+                <a:spcPct val="80000"/>
+              </a:lnSpc>
+              <a:spcBef>
+                <a:spcPts val="1000"/>
+              </a:spcBef>
+              <a:defRPr b="0" sz="1100">
+                <a:solidFill>
+                  <a:srgbClr val="000000"/>
+                </a:solidFill>
+              </a:defRPr>
+            </a:pPr>
+            <a:r>
+              <a:t>Python is available on your system. Also </a:t>
+            </a:r>
+            <a:r>
+              <a:rPr b="1"/>
+              <a:t>py_module_available</a:t>
+            </a:r>
+            <a:r>
+              <a:t>, </a:t>
+            </a:r>
+            <a:r>
+              <a:rPr b="1"/>
+              <a:t>py_numpy_module.</a:t>
+            </a:r>
+            <a:r>
+              <a:t> </a:t>
+            </a:r>
+            <a:r>
+              <a:rPr i="1"/>
+              <a:t>py_available()</a:t>
+            </a:r>
+          </a:p>
+        </p:txBody>
+      </p:sp>
+      <p:sp>
+        <p:nvSpPr>
+          <p:cNvPr id="215" name="Line"/>
+          <p:cNvSpPr/>
+          <p:nvPr/>
+        </p:nvSpPr>
+        <p:spPr>
+          <a:xfrm flipV="1">
+            <a:off x="5540380" y="1688817"/>
+            <a:ext cx="977308" cy="3193698"/>
+          </a:xfrm>
+          <a:prstGeom prst="line">
+            <a:avLst/>
+          </a:prstGeom>
+          <a:ln>
+            <a:solidFill>
+              <a:srgbClr val="000000"/>
+            </a:solidFill>
+            <a:custDash>
+              <a:ds d="100000" sp="200000"/>
+            </a:custDash>
+          </a:ln>
+        </p:spPr>
+        <p:txBody>
+          <a:bodyPr lIns="54570" tIns="54570" rIns="54570" bIns="54570" anchor="ctr"/>
+          <a:lstStyle/>
+          <a:p>
+            <a:pPr algn="ctr">
+              <a:spcBef>
+                <a:spcPts val="0"/>
+              </a:spcBef>
+              <a:defRPr b="0" sz="2600">
+                <a:solidFill>
+                  <a:srgbClr val="000000"/>
+                </a:solidFill>
+                <a:latin typeface="Helvetica Light"/>
+                <a:ea typeface="Helvetica Light"/>
+                <a:cs typeface="Helvetica Light"/>
+                <a:sym typeface="Helvetica Light"/>
+              </a:defRPr>
+            </a:pPr>
+          </a:p>
+        </p:txBody>
+      </p:sp>
       <p:pic>
         <p:nvPicPr>
-          <p:cNvPr id="202" name="Image" descr="Image"/>
+          <p:cNvPr id="216" name="Screen Shot 2019-04-24 at 3.07.57 PM.png" descr="Screen Shot 2019-04-24 at 3.07.57 PM.png"/>
           <p:cNvPicPr>
             <a:picLocks noChangeAspect="1"/>
           </p:cNvPicPr>
@@ -9081,8 +9778,8 @@
         </p:blipFill>
         <p:spPr>
           <a:xfrm>
-            <a:off x="11952068" y="136271"/>
-            <a:ext cx="2084548" cy="1455517"/>
+            <a:off x="2721593" y="3149581"/>
+            <a:ext cx="129671" cy="160971"/>
           </a:xfrm>
           <a:prstGeom prst="rect">
             <a:avLst/>
@@ -9092,787 +9789,9 @@
           </a:ln>
         </p:spPr>
       </p:pic>
-      <p:sp>
-        <p:nvSpPr>
-          <p:cNvPr id="203" name="Python in the IDE"/>
-          <p:cNvSpPr txBox="1"/>
-          <p:nvPr/>
-        </p:nvSpPr>
-        <p:spPr>
-          <a:xfrm>
-            <a:off x="316389" y="723899"/>
-            <a:ext cx="2317751" cy="431801"/>
-          </a:xfrm>
-          <a:prstGeom prst="rect">
-            <a:avLst/>
-          </a:prstGeom>
-          <a:ln w="12700">
-            <a:miter lim="400000"/>
-          </a:ln>
-          <a:extLst>
-            <a:ext uri="{C572A759-6A51-4108-AA02-DFA0A04FC94B}">
-              <ma14:wrappingTextBoxFlag xmlns:ma14="http://schemas.microsoft.com/office/mac/drawingml/2011/main" val="1"/>
-            </a:ext>
-          </a:extLst>
-        </p:spPr>
-        <p:txBody>
-          <a:bodyPr wrap="none" lIns="12700" tIns="12700" rIns="12700" bIns="12700" anchor="ctr">
-            <a:spAutoFit/>
-          </a:bodyPr>
-          <a:lstStyle/>
-          <a:p>
-            <a:pPr lvl="1" indent="0">
-              <a:lnSpc>
-                <a:spcPct val="80000"/>
-              </a:lnSpc>
-              <a:spcBef>
-                <a:spcPts val="0"/>
-              </a:spcBef>
-              <a:defRPr b="0" sz="2500">
-                <a:solidFill>
-                  <a:srgbClr val="654F25"/>
-                </a:solidFill>
-              </a:defRPr>
-            </a:pPr>
-            <a:r>
-              <a:t>Python in the IDE</a:t>
-            </a:r>
-          </a:p>
-        </p:txBody>
-      </p:sp>
-      <p:sp>
-        <p:nvSpPr>
-          <p:cNvPr id="204" name="Requires reticulate plus RStudio v1.2 or higher."/>
-          <p:cNvSpPr txBox="1"/>
-          <p:nvPr/>
-        </p:nvSpPr>
-        <p:spPr>
-          <a:xfrm>
-            <a:off x="2706170" y="927715"/>
-            <a:ext cx="3311341" cy="235572"/>
-          </a:xfrm>
-          <a:prstGeom prst="rect">
-            <a:avLst/>
-          </a:prstGeom>
-          <a:ln w="12700">
-            <a:miter lim="400000"/>
-          </a:ln>
-          <a:extLst>
-            <a:ext uri="{C572A759-6A51-4108-AA02-DFA0A04FC94B}">
-              <ma14:wrappingTextBoxFlag xmlns:ma14="http://schemas.microsoft.com/office/mac/drawingml/2011/main" val="1"/>
-            </a:ext>
-          </a:extLst>
-        </p:spPr>
-        <p:txBody>
-          <a:bodyPr lIns="0" tIns="0" rIns="0" bIns="0">
-            <a:normAutofit fontScale="100000" lnSpcReduction="0"/>
-          </a:bodyPr>
-          <a:lstStyle>
-            <a:lvl1pPr>
-              <a:lnSpc>
-                <a:spcPct val="80000"/>
-              </a:lnSpc>
-              <a:spcBef>
-                <a:spcPts val="1000"/>
-              </a:spcBef>
-              <a:defRPr b="0" sz="1100">
-                <a:solidFill>
-                  <a:srgbClr val="000000"/>
-                </a:solidFill>
-              </a:defRPr>
-            </a:lvl1pPr>
-          </a:lstStyle>
-          <a:p>
-            <a:pPr/>
-            <a:r>
-              <a:t>Requires reticulate plus RStudio v1.2 or higher.</a:t>
-            </a:r>
-          </a:p>
-        </p:txBody>
-      </p:sp>
-      <p:sp>
-        <p:nvSpPr>
-          <p:cNvPr id="205" name="matplotlib plots display in plots pane."/>
-          <p:cNvSpPr txBox="1"/>
-          <p:nvPr/>
-        </p:nvSpPr>
-        <p:spPr>
-          <a:xfrm>
-            <a:off x="6048999" y="1174839"/>
-            <a:ext cx="847877" cy="616477"/>
-          </a:xfrm>
-          <a:prstGeom prst="rect">
-            <a:avLst/>
-          </a:prstGeom>
-          <a:ln w="12700">
-            <a:miter lim="400000"/>
-          </a:ln>
-          <a:extLst>
-            <a:ext uri="{C572A759-6A51-4108-AA02-DFA0A04FC94B}">
-              <ma14:wrappingTextBoxFlag xmlns:ma14="http://schemas.microsoft.com/office/mac/drawingml/2011/main" val="1"/>
-            </a:ext>
-          </a:extLst>
-        </p:spPr>
-        <p:txBody>
-          <a:bodyPr lIns="0" tIns="0" rIns="0" bIns="0">
-            <a:normAutofit fontScale="100000" lnSpcReduction="0"/>
-          </a:bodyPr>
-          <a:lstStyle>
-            <a:lvl1pPr>
-              <a:lnSpc>
-                <a:spcPct val="80000"/>
-              </a:lnSpc>
-              <a:spcBef>
-                <a:spcPts val="1000"/>
-              </a:spcBef>
-              <a:defRPr b="0" sz="1100">
-                <a:solidFill>
-                  <a:srgbClr val="000000"/>
-                </a:solidFill>
-              </a:defRPr>
-            </a:lvl1pPr>
-          </a:lstStyle>
-          <a:p>
-            <a:pPr/>
-            <a:r>
-              <a:t>matplotlib plots display in plots pane.</a:t>
-            </a:r>
-          </a:p>
-        </p:txBody>
-      </p:sp>
-      <p:sp>
-        <p:nvSpPr>
-          <p:cNvPr id="206" name="Execute Python code line by line with Cmd +  Enter (Ctrl + Enter)"/>
-          <p:cNvSpPr txBox="1"/>
-          <p:nvPr/>
-        </p:nvSpPr>
-        <p:spPr>
-          <a:xfrm>
-            <a:off x="3772902" y="1163873"/>
-            <a:ext cx="1104512" cy="616477"/>
-          </a:xfrm>
-          <a:prstGeom prst="rect">
-            <a:avLst/>
-          </a:prstGeom>
-          <a:ln w="12700">
-            <a:miter lim="400000"/>
-          </a:ln>
-          <a:extLst>
-            <a:ext uri="{C572A759-6A51-4108-AA02-DFA0A04FC94B}">
-              <ma14:wrappingTextBoxFlag xmlns:ma14="http://schemas.microsoft.com/office/mac/drawingml/2011/main" val="1"/>
-            </a:ext>
-          </a:extLst>
-        </p:spPr>
-        <p:txBody>
-          <a:bodyPr lIns="0" tIns="0" rIns="0" bIns="0">
-            <a:normAutofit fontScale="100000" lnSpcReduction="0"/>
-          </a:bodyPr>
-          <a:lstStyle/>
-          <a:p>
-            <a:pPr>
-              <a:lnSpc>
-                <a:spcPct val="80000"/>
-              </a:lnSpc>
-              <a:spcBef>
-                <a:spcPts val="1000"/>
-              </a:spcBef>
-              <a:defRPr b="0" sz="1100">
-                <a:solidFill>
-                  <a:srgbClr val="000000"/>
-                </a:solidFill>
-              </a:defRPr>
-            </a:pPr>
-            <a:r>
-              <a:t>Execute Python code line by line with </a:t>
-            </a:r>
-            <a:r>
-              <a:rPr>
-                <a:latin typeface="Source Sans Pro Semibold"/>
-                <a:ea typeface="Source Sans Pro Semibold"/>
-                <a:cs typeface="Source Sans Pro Semibold"/>
-                <a:sym typeface="Source Sans Pro Semibold"/>
-              </a:rPr>
-              <a:t>Cmd +  Enter</a:t>
-            </a:r>
-            <a:r>
-              <a:t> (</a:t>
-            </a:r>
-            <a:r>
-              <a:rPr>
-                <a:latin typeface="Source Sans Pro Semibold"/>
-                <a:ea typeface="Source Sans Pro Semibold"/>
-                <a:cs typeface="Source Sans Pro Semibold"/>
-                <a:sym typeface="Source Sans Pro Semibold"/>
-              </a:rPr>
-              <a:t>Ctrl + Enter</a:t>
-            </a:r>
-            <a:r>
-              <a:t>)</a:t>
-            </a:r>
-          </a:p>
-        </p:txBody>
-      </p:sp>
-      <p:sp>
-        <p:nvSpPr>
-          <p:cNvPr id="207" name="Source Python scripts."/>
-          <p:cNvSpPr txBox="1"/>
-          <p:nvPr/>
-        </p:nvSpPr>
-        <p:spPr>
-          <a:xfrm>
-            <a:off x="3151066" y="1174839"/>
-            <a:ext cx="506588" cy="573091"/>
-          </a:xfrm>
-          <a:prstGeom prst="rect">
-            <a:avLst/>
-          </a:prstGeom>
-          <a:ln w="12700">
-            <a:miter lim="400000"/>
-          </a:ln>
-          <a:extLst>
-            <a:ext uri="{C572A759-6A51-4108-AA02-DFA0A04FC94B}">
-              <ma14:wrappingTextBoxFlag xmlns:ma14="http://schemas.microsoft.com/office/mac/drawingml/2011/main" val="1"/>
-            </a:ext>
-          </a:extLst>
-        </p:spPr>
-        <p:txBody>
-          <a:bodyPr lIns="0" tIns="0" rIns="0" bIns="0">
-            <a:normAutofit fontScale="100000" lnSpcReduction="0"/>
-          </a:bodyPr>
-          <a:lstStyle>
-            <a:lvl1pPr>
-              <a:lnSpc>
-                <a:spcPct val="80000"/>
-              </a:lnSpc>
-              <a:spcBef>
-                <a:spcPts val="1000"/>
-              </a:spcBef>
-              <a:defRPr b="0" sz="1100">
-                <a:solidFill>
-                  <a:srgbClr val="000000"/>
-                </a:solidFill>
-              </a:defRPr>
-            </a:lvl1pPr>
-          </a:lstStyle>
-          <a:p>
-            <a:pPr/>
-            <a:r>
-              <a:t>Source Python scripts.</a:t>
-            </a:r>
-          </a:p>
-        </p:txBody>
-      </p:sp>
-      <p:sp>
-        <p:nvSpPr>
-          <p:cNvPr id="208" name="Syntax highlighting for Python scripts and chunks"/>
-          <p:cNvSpPr txBox="1"/>
-          <p:nvPr/>
-        </p:nvSpPr>
-        <p:spPr>
-          <a:xfrm>
-            <a:off x="313325" y="1177399"/>
-            <a:ext cx="1016404" cy="614825"/>
-          </a:xfrm>
-          <a:prstGeom prst="rect">
-            <a:avLst/>
-          </a:prstGeom>
-          <a:ln w="12700">
-            <a:miter lim="400000"/>
-          </a:ln>
-          <a:extLst>
-            <a:ext uri="{C572A759-6A51-4108-AA02-DFA0A04FC94B}">
-              <ma14:wrappingTextBoxFlag xmlns:ma14="http://schemas.microsoft.com/office/mac/drawingml/2011/main" val="1"/>
-            </a:ext>
-          </a:extLst>
-        </p:spPr>
-        <p:txBody>
-          <a:bodyPr lIns="0" tIns="0" rIns="0" bIns="0">
-            <a:normAutofit fontScale="100000" lnSpcReduction="0"/>
-          </a:bodyPr>
-          <a:lstStyle>
-            <a:lvl1pPr>
-              <a:lnSpc>
-                <a:spcPct val="80000"/>
-              </a:lnSpc>
-              <a:spcBef>
-                <a:spcPts val="1000"/>
-              </a:spcBef>
-              <a:defRPr b="0" sz="1100">
-                <a:solidFill>
-                  <a:srgbClr val="000000"/>
-                </a:solidFill>
-              </a:defRPr>
-            </a:lvl1pPr>
-          </a:lstStyle>
-          <a:p>
-            <a:pPr/>
-            <a:r>
-              <a:t>Syntax highlighting for Python scripts and chunks</a:t>
-            </a:r>
-          </a:p>
-        </p:txBody>
-      </p:sp>
-      <p:sp>
-        <p:nvSpPr>
-          <p:cNvPr id="209" name="Press F1 over a Python symbol to display the help topic for that symbol."/>
-          <p:cNvSpPr txBox="1"/>
-          <p:nvPr/>
-        </p:nvSpPr>
-        <p:spPr>
-          <a:xfrm>
-            <a:off x="4999567" y="1174839"/>
-            <a:ext cx="990779" cy="860426"/>
-          </a:xfrm>
-          <a:prstGeom prst="rect">
-            <a:avLst/>
-          </a:prstGeom>
-          <a:ln w="12700">
-            <a:miter lim="400000"/>
-          </a:ln>
-          <a:extLst>
-            <a:ext uri="{C572A759-6A51-4108-AA02-DFA0A04FC94B}">
-              <ma14:wrappingTextBoxFlag xmlns:ma14="http://schemas.microsoft.com/office/mac/drawingml/2011/main" val="1"/>
-            </a:ext>
-          </a:extLst>
-        </p:spPr>
-        <p:txBody>
-          <a:bodyPr lIns="0" tIns="0" rIns="0" bIns="0">
-            <a:normAutofit fontScale="100000" lnSpcReduction="0"/>
-          </a:bodyPr>
-          <a:lstStyle/>
-          <a:p>
-            <a:pPr>
-              <a:lnSpc>
-                <a:spcPct val="80000"/>
-              </a:lnSpc>
-              <a:spcBef>
-                <a:spcPts val="1000"/>
-              </a:spcBef>
-              <a:defRPr b="0" sz="1100">
-                <a:solidFill>
-                  <a:srgbClr val="000000"/>
-                </a:solidFill>
-              </a:defRPr>
-            </a:pPr>
-            <a:r>
-              <a:t>Press </a:t>
-            </a:r>
-            <a:r>
-              <a:rPr>
-                <a:latin typeface="Source Sans Pro Semibold"/>
-                <a:ea typeface="Source Sans Pro Semibold"/>
-                <a:cs typeface="Source Sans Pro Semibold"/>
-                <a:sym typeface="Source Sans Pro Semibold"/>
-              </a:rPr>
-              <a:t>F1</a:t>
-            </a:r>
-            <a:r>
-              <a:t> over a Python symbol to display the help topic for that symbol.</a:t>
-            </a:r>
-          </a:p>
-        </p:txBody>
-      </p:sp>
-      <p:sp>
-        <p:nvSpPr>
-          <p:cNvPr id="210" name="Tab completion for Python functions and objects (and Python modules imported in R scripts)"/>
-          <p:cNvSpPr txBox="1"/>
-          <p:nvPr/>
-        </p:nvSpPr>
-        <p:spPr>
-          <a:xfrm>
-            <a:off x="1382076" y="1174839"/>
-            <a:ext cx="1564022" cy="616477"/>
-          </a:xfrm>
-          <a:prstGeom prst="rect">
-            <a:avLst/>
-          </a:prstGeom>
-          <a:ln w="12700">
-            <a:miter lim="400000"/>
-          </a:ln>
-          <a:extLst>
-            <a:ext uri="{C572A759-6A51-4108-AA02-DFA0A04FC94B}">
-              <ma14:wrappingTextBoxFlag xmlns:ma14="http://schemas.microsoft.com/office/mac/drawingml/2011/main" val="1"/>
-            </a:ext>
-          </a:extLst>
-        </p:spPr>
-        <p:txBody>
-          <a:bodyPr lIns="0" tIns="0" rIns="0" bIns="0">
-            <a:normAutofit fontScale="100000" lnSpcReduction="0"/>
-          </a:bodyPr>
-          <a:lstStyle>
-            <a:lvl1pPr>
-              <a:lnSpc>
-                <a:spcPct val="80000"/>
-              </a:lnSpc>
-              <a:spcBef>
-                <a:spcPts val="1000"/>
-              </a:spcBef>
-              <a:defRPr b="0" sz="1100">
-                <a:solidFill>
-                  <a:srgbClr val="000000"/>
-                </a:solidFill>
-              </a:defRPr>
-            </a:lvl1pPr>
-          </a:lstStyle>
-          <a:p>
-            <a:pPr/>
-            <a:r>
-              <a:t>Tab completion for Python functions and objects (and Python modules imported in R scripts)</a:t>
-            </a:r>
-          </a:p>
-        </p:txBody>
-      </p:sp>
-      <p:sp>
-        <p:nvSpPr>
-          <p:cNvPr id="211" name="Line"/>
-          <p:cNvSpPr/>
-          <p:nvPr/>
-        </p:nvSpPr>
-        <p:spPr>
-          <a:xfrm>
-            <a:off x="7115337" y="723900"/>
-            <a:ext cx="4239786" cy="0"/>
-          </a:xfrm>
-          <a:prstGeom prst="line">
-            <a:avLst/>
-          </a:prstGeom>
-          <a:ln w="6350">
-            <a:solidFill>
-              <a:srgbClr val="767C85"/>
-            </a:solidFill>
-            <a:miter lim="400000"/>
-          </a:ln>
-        </p:spPr>
-        <p:txBody>
-          <a:bodyPr lIns="54570" tIns="54570" rIns="54570" bIns="54570" anchor="ctr"/>
-          <a:lstStyle/>
-          <a:p>
-            <a:pPr>
-              <a:lnSpc>
-                <a:spcPct val="80000"/>
-              </a:lnSpc>
-              <a:spcBef>
-                <a:spcPts val="600"/>
-              </a:spcBef>
-              <a:defRPr b="0">
-                <a:solidFill>
-                  <a:srgbClr val="000000"/>
-                </a:solidFill>
-              </a:defRPr>
-            </a:pPr>
-          </a:p>
-        </p:txBody>
-      </p:sp>
-      <p:sp>
-        <p:nvSpPr>
-          <p:cNvPr id="212" name="Line"/>
-          <p:cNvSpPr/>
-          <p:nvPr/>
-        </p:nvSpPr>
-        <p:spPr>
-          <a:xfrm>
-            <a:off x="320653" y="6836788"/>
-            <a:ext cx="2670138" cy="1"/>
-          </a:xfrm>
-          <a:prstGeom prst="line">
-            <a:avLst/>
-          </a:prstGeom>
-          <a:ln w="6350">
-            <a:solidFill>
-              <a:srgbClr val="767C85"/>
-            </a:solidFill>
-            <a:miter lim="400000"/>
-          </a:ln>
-        </p:spPr>
-        <p:txBody>
-          <a:bodyPr lIns="54570" tIns="54570" rIns="54570" bIns="54570" anchor="ctr"/>
-          <a:lstStyle/>
-          <a:p>
-            <a:pPr>
-              <a:lnSpc>
-                <a:spcPct val="80000"/>
-              </a:lnSpc>
-              <a:spcBef>
-                <a:spcPts val="600"/>
-              </a:spcBef>
-              <a:defRPr b="0">
-                <a:solidFill>
-                  <a:srgbClr val="000000"/>
-                </a:solidFill>
-              </a:defRPr>
-            </a:pPr>
-          </a:p>
-        </p:txBody>
-      </p:sp>
-      <p:sp>
-        <p:nvSpPr>
-          <p:cNvPr id="213" name="Python REPL"/>
-          <p:cNvSpPr txBox="1"/>
-          <p:nvPr/>
-        </p:nvSpPr>
-        <p:spPr>
-          <a:xfrm>
-            <a:off x="317810" y="6824088"/>
-            <a:ext cx="1737361" cy="431801"/>
-          </a:xfrm>
-          <a:prstGeom prst="rect">
-            <a:avLst/>
-          </a:prstGeom>
-          <a:ln w="12700">
-            <a:miter lim="400000"/>
-          </a:ln>
-          <a:extLst>
-            <a:ext uri="{C572A759-6A51-4108-AA02-DFA0A04FC94B}">
-              <ma14:wrappingTextBoxFlag xmlns:ma14="http://schemas.microsoft.com/office/mac/drawingml/2011/main" val="1"/>
-            </a:ext>
-          </a:extLst>
-        </p:spPr>
-        <p:txBody>
-          <a:bodyPr wrap="none" lIns="12700" tIns="12700" rIns="12700" bIns="12700" anchor="ctr">
-            <a:spAutoFit/>
-          </a:bodyPr>
-          <a:lstStyle/>
-          <a:p>
-            <a:pPr lvl="1" indent="0">
-              <a:lnSpc>
-                <a:spcPct val="80000"/>
-              </a:lnSpc>
-              <a:spcBef>
-                <a:spcPts val="0"/>
-              </a:spcBef>
-              <a:defRPr b="0" sz="2500">
-                <a:solidFill>
-                  <a:srgbClr val="654F25"/>
-                </a:solidFill>
-              </a:defRPr>
-            </a:pPr>
-            <a:r>
-              <a:t>Python REPL</a:t>
-            </a:r>
-          </a:p>
-        </p:txBody>
-      </p:sp>
-      <p:sp>
-        <p:nvSpPr>
-          <p:cNvPr id="214" name="Install Packages"/>
-          <p:cNvSpPr txBox="1"/>
-          <p:nvPr/>
-        </p:nvSpPr>
-        <p:spPr>
-          <a:xfrm>
-            <a:off x="7207322" y="5256577"/>
-            <a:ext cx="2138999" cy="431801"/>
-          </a:xfrm>
-          <a:prstGeom prst="rect">
-            <a:avLst/>
-          </a:prstGeom>
-          <a:ln w="12700">
-            <a:miter lim="400000"/>
-          </a:ln>
-          <a:extLst>
-            <a:ext uri="{C572A759-6A51-4108-AA02-DFA0A04FC94B}">
-              <ma14:wrappingTextBoxFlag xmlns:ma14="http://schemas.microsoft.com/office/mac/drawingml/2011/main" val="1"/>
-            </a:ext>
-          </a:extLst>
-        </p:spPr>
-        <p:txBody>
-          <a:bodyPr wrap="none" lIns="12700" tIns="12700" rIns="12700" bIns="12700" anchor="ctr">
-            <a:spAutoFit/>
-          </a:bodyPr>
-          <a:lstStyle/>
-          <a:p>
-            <a:pPr lvl="1" indent="0">
-              <a:lnSpc>
-                <a:spcPct val="80000"/>
-              </a:lnSpc>
-              <a:spcBef>
-                <a:spcPts val="0"/>
-              </a:spcBef>
-              <a:defRPr b="0" sz="2500">
-                <a:solidFill>
-                  <a:srgbClr val="654F25"/>
-                </a:solidFill>
-              </a:defRPr>
-            </a:pPr>
-            <a:r>
-              <a:t>Install Packages</a:t>
-            </a:r>
-          </a:p>
-        </p:txBody>
-      </p:sp>
-      <p:sp>
-        <p:nvSpPr>
-          <p:cNvPr id="215" name="py_discover_config() Return all detected versions of Python. Use py_config to check which version has been loaded. py_config()…"/>
-          <p:cNvSpPr txBox="1"/>
-          <p:nvPr/>
-        </p:nvSpPr>
-        <p:spPr>
-          <a:xfrm>
-            <a:off x="7178505" y="2140720"/>
-            <a:ext cx="3247891" cy="1271794"/>
-          </a:xfrm>
-          <a:prstGeom prst="rect">
-            <a:avLst/>
-          </a:prstGeom>
-          <a:ln w="12700">
-            <a:miter lim="400000"/>
-          </a:ln>
-          <a:extLst>
-            <a:ext uri="{C572A759-6A51-4108-AA02-DFA0A04FC94B}">
-              <ma14:wrappingTextBoxFlag xmlns:ma14="http://schemas.microsoft.com/office/mac/drawingml/2011/main" val="1"/>
-            </a:ext>
-          </a:extLst>
-        </p:spPr>
-        <p:txBody>
-          <a:bodyPr lIns="0" tIns="0" rIns="0" bIns="0">
-            <a:normAutofit fontScale="100000" lnSpcReduction="0"/>
-          </a:bodyPr>
-          <a:lstStyle/>
-          <a:p>
-            <a:pPr marL="381000" indent="-127000">
-              <a:lnSpc>
-                <a:spcPct val="80000"/>
-              </a:lnSpc>
-              <a:spcBef>
-                <a:spcPts val="1000"/>
-              </a:spcBef>
-              <a:buSzPct val="100000"/>
-              <a:buChar char="•"/>
-              <a:defRPr b="0" sz="1100">
-                <a:solidFill>
-                  <a:srgbClr val="000000"/>
-                </a:solidFill>
-              </a:defRPr>
-            </a:pPr>
-            <a:r>
-              <a:rPr b="1"/>
-              <a:t>py_discover_config</a:t>
-            </a:r>
-            <a:r>
-              <a:t>() Return all detected versions of Python. Use </a:t>
-            </a:r>
-            <a:r>
-              <a:rPr b="1"/>
-              <a:t>py_config</a:t>
-            </a:r>
-            <a:r>
-              <a:t> to check which version has been loaded. </a:t>
-            </a:r>
-            <a:r>
-              <a:rPr i="1"/>
-              <a:t>py_config()</a:t>
-            </a:r>
-            <a:endParaRPr i="1"/>
-          </a:p>
-          <a:p>
-            <a:pPr marL="381000" indent="-127000">
-              <a:lnSpc>
-                <a:spcPct val="80000"/>
-              </a:lnSpc>
-              <a:spcBef>
-                <a:spcPts val="0"/>
-              </a:spcBef>
-              <a:buSzPct val="100000"/>
-              <a:buChar char="•"/>
-              <a:defRPr b="0" sz="1100">
-                <a:solidFill>
-                  <a:srgbClr val="000000"/>
-                </a:solidFill>
-              </a:defRPr>
-            </a:pPr>
-            <a:r>
-              <a:rPr b="1"/>
-              <a:t>py_available</a:t>
-            </a:r>
-            <a:r>
-              <a:t>(initialize = FALSE) Check if </a:t>
-            </a:r>
-          </a:p>
-          <a:p>
-            <a:pPr indent="254000">
-              <a:lnSpc>
-                <a:spcPct val="80000"/>
-              </a:lnSpc>
-              <a:spcBef>
-                <a:spcPts val="1000"/>
-              </a:spcBef>
-              <a:defRPr b="0" sz="1100">
-                <a:solidFill>
-                  <a:srgbClr val="000000"/>
-                </a:solidFill>
-              </a:defRPr>
-            </a:pPr>
-            <a:r>
-              <a:t>Python is available on your system. Also </a:t>
-            </a:r>
-            <a:r>
-              <a:rPr b="1"/>
-              <a:t>py_module_available</a:t>
-            </a:r>
-            <a:r>
-              <a:t>, </a:t>
-            </a:r>
-            <a:r>
-              <a:rPr b="1"/>
-              <a:t>py_numpy_module.</a:t>
-            </a:r>
-            <a:r>
-              <a:t> </a:t>
-            </a:r>
-            <a:r>
-              <a:rPr i="1"/>
-              <a:t>py_available()</a:t>
-            </a:r>
-          </a:p>
-        </p:txBody>
-      </p:sp>
-      <p:sp>
-        <p:nvSpPr>
-          <p:cNvPr id="216" name="Line"/>
-          <p:cNvSpPr/>
-          <p:nvPr/>
-        </p:nvSpPr>
-        <p:spPr>
-          <a:xfrm flipV="1">
-            <a:off x="5540380" y="1688817"/>
-            <a:ext cx="977309" cy="3193698"/>
-          </a:xfrm>
-          <a:prstGeom prst="line">
-            <a:avLst/>
-          </a:prstGeom>
-          <a:ln>
-            <a:solidFill>
-              <a:srgbClr val="000000"/>
-            </a:solidFill>
-            <a:custDash>
-              <a:ds d="100000" sp="200000"/>
-            </a:custDash>
-          </a:ln>
-        </p:spPr>
-        <p:txBody>
-          <a:bodyPr lIns="54570" tIns="54570" rIns="54570" bIns="54570" anchor="ctr"/>
-          <a:lstStyle/>
-          <a:p>
-            <a:pPr algn="ctr">
-              <a:spcBef>
-                <a:spcPts val="0"/>
-              </a:spcBef>
-              <a:defRPr b="0" sz="2600">
-                <a:solidFill>
-                  <a:srgbClr val="000000"/>
-                </a:solidFill>
-                <a:latin typeface="Helvetica Light"/>
-                <a:ea typeface="Helvetica Light"/>
-                <a:cs typeface="Helvetica Light"/>
-                <a:sym typeface="Helvetica Light"/>
-              </a:defRPr>
-            </a:pPr>
-          </a:p>
-        </p:txBody>
-      </p:sp>
       <p:pic>
         <p:nvPicPr>
-          <p:cNvPr id="217" name="Screen Shot 2019-04-24 at 3.07.57 PM.png" descr="Screen Shot 2019-04-24 at 3.07.57 PM.png"/>
+          <p:cNvPr id="217" name="Screen Shot 2019-04-24 at 3.06.42 PM.png" descr="Screen Shot 2019-04-24 at 3.06.42 PM.png"/>
           <p:cNvPicPr>
             <a:picLocks noChangeAspect="1"/>
           </p:cNvPicPr>
@@ -9882,14 +9801,15 @@
           <a:blip r:embed="rId10">
             <a:extLst/>
           </a:blip>
+          <a:srcRect l="473" t="1694" r="473" b="1694"/>
           <a:stretch>
             <a:fillRect/>
           </a:stretch>
         </p:blipFill>
         <p:spPr>
           <a:xfrm>
-            <a:off x="2721593" y="3149581"/>
-            <a:ext cx="129671" cy="160971"/>
+            <a:off x="2784441" y="3304951"/>
+            <a:ext cx="833557" cy="454668"/>
           </a:xfrm>
           <a:prstGeom prst="rect">
             <a:avLst/>
@@ -9899,9 +9819,405 @@
           </a:ln>
         </p:spPr>
       </p:pic>
+      <p:sp>
+        <p:nvSpPr>
+          <p:cNvPr id="218" name="Line"/>
+          <p:cNvSpPr/>
+          <p:nvPr/>
+        </p:nvSpPr>
+        <p:spPr>
+          <a:xfrm flipH="1" flipV="1">
+            <a:off x="752719" y="1815817"/>
+            <a:ext cx="556540" cy="719955"/>
+          </a:xfrm>
+          <a:prstGeom prst="line">
+            <a:avLst/>
+          </a:prstGeom>
+          <a:ln>
+            <a:solidFill>
+              <a:srgbClr val="000000"/>
+            </a:solidFill>
+            <a:custDash>
+              <a:ds d="100000" sp="200000"/>
+            </a:custDash>
+          </a:ln>
+        </p:spPr>
+        <p:txBody>
+          <a:bodyPr lIns="54570" tIns="54570" rIns="54570" bIns="54570" anchor="ctr"/>
+          <a:lstStyle/>
+          <a:p>
+            <a:pPr algn="ctr">
+              <a:spcBef>
+                <a:spcPts val="0"/>
+              </a:spcBef>
+              <a:defRPr b="0" sz="2600">
+                <a:solidFill>
+                  <a:srgbClr val="000000"/>
+                </a:solidFill>
+                <a:latin typeface="Helvetica Light"/>
+                <a:ea typeface="Helvetica Light"/>
+                <a:cs typeface="Helvetica Light"/>
+                <a:sym typeface="Helvetica Light"/>
+              </a:defRPr>
+            </a:pPr>
+          </a:p>
+        </p:txBody>
+      </p:sp>
+      <p:sp>
+        <p:nvSpPr>
+          <p:cNvPr id="219" name="Line"/>
+          <p:cNvSpPr/>
+          <p:nvPr/>
+        </p:nvSpPr>
+        <p:spPr>
+          <a:xfrm flipH="1" flipV="1">
+            <a:off x="2269104" y="1834556"/>
+            <a:ext cx="685209" cy="1467847"/>
+          </a:xfrm>
+          <a:prstGeom prst="line">
+            <a:avLst/>
+          </a:prstGeom>
+          <a:ln>
+            <a:solidFill>
+              <a:srgbClr val="000000"/>
+            </a:solidFill>
+            <a:custDash>
+              <a:ds d="100000" sp="200000"/>
+            </a:custDash>
+          </a:ln>
+        </p:spPr>
+        <p:txBody>
+          <a:bodyPr lIns="54570" tIns="54570" rIns="54570" bIns="54570" anchor="ctr"/>
+          <a:lstStyle/>
+          <a:p>
+            <a:pPr algn="ctr">
+              <a:spcBef>
+                <a:spcPts val="0"/>
+              </a:spcBef>
+              <a:defRPr b="0" sz="2600">
+                <a:solidFill>
+                  <a:srgbClr val="000000"/>
+                </a:solidFill>
+                <a:latin typeface="Helvetica Light"/>
+                <a:ea typeface="Helvetica Light"/>
+                <a:cs typeface="Helvetica Light"/>
+                <a:sym typeface="Helvetica Light"/>
+              </a:defRPr>
+            </a:pPr>
+          </a:p>
+        </p:txBody>
+      </p:sp>
+      <p:sp>
+        <p:nvSpPr>
+          <p:cNvPr id="220" name="Line"/>
+          <p:cNvSpPr/>
+          <p:nvPr/>
+        </p:nvSpPr>
+        <p:spPr>
+          <a:xfrm flipH="1" flipV="1">
+            <a:off x="3261817" y="1688817"/>
+            <a:ext cx="107287" cy="679037"/>
+          </a:xfrm>
+          <a:prstGeom prst="line">
+            <a:avLst/>
+          </a:prstGeom>
+          <a:ln>
+            <a:solidFill>
+              <a:srgbClr val="000000"/>
+            </a:solidFill>
+            <a:custDash>
+              <a:ds d="100000" sp="200000"/>
+            </a:custDash>
+          </a:ln>
+        </p:spPr>
+        <p:txBody>
+          <a:bodyPr lIns="54570" tIns="54570" rIns="54570" bIns="54570" anchor="ctr"/>
+          <a:lstStyle/>
+          <a:p>
+            <a:pPr algn="ctr">
+              <a:spcBef>
+                <a:spcPts val="0"/>
+              </a:spcBef>
+              <a:defRPr b="0" sz="2600">
+                <a:solidFill>
+                  <a:srgbClr val="000000"/>
+                </a:solidFill>
+                <a:latin typeface="Helvetica Light"/>
+                <a:ea typeface="Helvetica Light"/>
+                <a:cs typeface="Helvetica Light"/>
+                <a:sym typeface="Helvetica Light"/>
+              </a:defRPr>
+            </a:pPr>
+          </a:p>
+        </p:txBody>
+      </p:sp>
+      <p:sp>
+        <p:nvSpPr>
+          <p:cNvPr id="221" name="Line"/>
+          <p:cNvSpPr/>
+          <p:nvPr/>
+        </p:nvSpPr>
+        <p:spPr>
+          <a:xfrm flipV="1">
+            <a:off x="5144595" y="1909512"/>
+            <a:ext cx="118919" cy="846956"/>
+          </a:xfrm>
+          <a:prstGeom prst="line">
+            <a:avLst/>
+          </a:prstGeom>
+          <a:ln>
+            <a:solidFill>
+              <a:srgbClr val="000000"/>
+            </a:solidFill>
+            <a:custDash>
+              <a:ds d="100000" sp="200000"/>
+            </a:custDash>
+          </a:ln>
+        </p:spPr>
+        <p:txBody>
+          <a:bodyPr lIns="54570" tIns="54570" rIns="54570" bIns="54570" anchor="ctr"/>
+          <a:lstStyle/>
+          <a:p>
+            <a:pPr algn="ctr">
+              <a:spcBef>
+                <a:spcPts val="0"/>
+              </a:spcBef>
+              <a:defRPr b="0" sz="2600">
+                <a:solidFill>
+                  <a:srgbClr val="000000"/>
+                </a:solidFill>
+                <a:latin typeface="Helvetica Light"/>
+                <a:ea typeface="Helvetica Light"/>
+                <a:cs typeface="Helvetica Light"/>
+                <a:sym typeface="Helvetica Light"/>
+              </a:defRPr>
+            </a:pPr>
+          </a:p>
+        </p:txBody>
+      </p:sp>
+      <p:sp>
+        <p:nvSpPr>
+          <p:cNvPr id="222" name="A REPL (Read, Eval, Print Loop) is a command line where you can run Python code and view the results.…"/>
+          <p:cNvSpPr txBox="1"/>
+          <p:nvPr/>
+        </p:nvSpPr>
+        <p:spPr>
+          <a:xfrm>
+            <a:off x="316189" y="7262130"/>
+            <a:ext cx="2679066" cy="3286432"/>
+          </a:xfrm>
+          <a:prstGeom prst="rect">
+            <a:avLst/>
+          </a:prstGeom>
+          <a:ln w="12700">
+            <a:miter lim="400000"/>
+          </a:ln>
+          <a:extLst>
+            <a:ext uri="{C572A759-6A51-4108-AA02-DFA0A04FC94B}">
+              <ma14:wrappingTextBoxFlag xmlns:ma14="http://schemas.microsoft.com/office/mac/drawingml/2011/main" val="1"/>
+            </a:ext>
+          </a:extLst>
+        </p:spPr>
+        <p:txBody>
+          <a:bodyPr lIns="0" tIns="0" rIns="0" bIns="0">
+            <a:normAutofit fontScale="100000" lnSpcReduction="0"/>
+          </a:bodyPr>
+          <a:lstStyle/>
+          <a:p>
+            <a:pPr>
+              <a:lnSpc>
+                <a:spcPct val="80000"/>
+              </a:lnSpc>
+              <a:spcBef>
+                <a:spcPts val="1000"/>
+              </a:spcBef>
+              <a:defRPr b="0" sz="1100">
+                <a:solidFill>
+                  <a:srgbClr val="7A4300"/>
+                </a:solidFill>
+              </a:defRPr>
+            </a:pPr>
+            <a:r>
+              <a:t>A REPL (Read, Eval, Print Loop) is a command line where you can run Python code and view the results.</a:t>
+            </a:r>
+          </a:p>
+          <a:p>
+            <a:pPr marL="190500" indent="-190500">
+              <a:lnSpc>
+                <a:spcPct val="80000"/>
+              </a:lnSpc>
+              <a:spcBef>
+                <a:spcPts val="1000"/>
+              </a:spcBef>
+              <a:buSzPct val="100000"/>
+              <a:buAutoNum type="arabicPeriod" startAt="1"/>
+              <a:defRPr b="0" sz="1100">
+                <a:solidFill>
+                  <a:srgbClr val="7A4300"/>
+                </a:solidFill>
+              </a:defRPr>
+            </a:pPr>
+            <a:r>
+              <a:t>Open in the console with </a:t>
+            </a:r>
+            <a:r>
+              <a:rPr b="1"/>
+              <a:t>repl_python</a:t>
+            </a:r>
+            <a:r>
+              <a:t>(), or by running code in a Python script with </a:t>
+            </a:r>
+            <a:r>
+              <a:rPr b="1"/>
+              <a:t>Cmd + Enter</a:t>
+            </a:r>
+            <a:r>
+              <a:t> (</a:t>
+            </a:r>
+            <a:r>
+              <a:rPr b="1"/>
+              <a:t>Ctrl + Enter</a:t>
+            </a:r>
+            <a:r>
+              <a:t>) .</a:t>
+            </a:r>
+          </a:p>
+          <a:p>
+            <a:pPr marL="381000" indent="-127000">
+              <a:lnSpc>
+                <a:spcPct val="80000"/>
+              </a:lnSpc>
+              <a:spcBef>
+                <a:spcPts val="1000"/>
+              </a:spcBef>
+              <a:buSzPct val="100000"/>
+              <a:buChar char="•"/>
+              <a:defRPr b="0" sz="1100">
+                <a:solidFill>
+                  <a:srgbClr val="000000"/>
+                </a:solidFill>
+              </a:defRPr>
+            </a:pPr>
+            <a:r>
+              <a:rPr b="1"/>
+              <a:t>repl_python</a:t>
+            </a:r>
+            <a:r>
+              <a:t>(module = NULL, quiet = getOption("reticulate.repl.quiet", default = FALSE)) Launch a Python REPL. Run </a:t>
+            </a:r>
+            <a:r>
+              <a:rPr b="1"/>
+              <a:t>exit</a:t>
+            </a:r>
+            <a:r>
+              <a:t> to close. </a:t>
+            </a:r>
+            <a:r>
+              <a:rPr i="1"/>
+              <a:t>repl_python() </a:t>
+            </a:r>
+          </a:p>
+          <a:p>
+            <a:pPr marL="228600" indent="-228600">
+              <a:lnSpc>
+                <a:spcPct val="80000"/>
+              </a:lnSpc>
+              <a:spcBef>
+                <a:spcPts val="1000"/>
+              </a:spcBef>
+              <a:buSzPct val="100000"/>
+              <a:buAutoNum type="arabicPeriod" startAt="2"/>
+              <a:defRPr b="0" sz="1100">
+                <a:solidFill>
+                  <a:srgbClr val="7A4300"/>
+                </a:solidFill>
+              </a:defRPr>
+            </a:pPr>
+            <a:r>
+              <a:t>Type commands at </a:t>
+            </a:r>
+            <a:r>
+              <a:rPr>
+                <a:latin typeface="Source Sans Pro Semibold"/>
+                <a:ea typeface="Source Sans Pro Semibold"/>
+                <a:cs typeface="Source Sans Pro Semibold"/>
+                <a:sym typeface="Source Sans Pro Semibold"/>
+              </a:rPr>
+              <a:t>&gt;&gt;&gt;</a:t>
+            </a:r>
+            <a:r>
+              <a:t> prompt</a:t>
+            </a:r>
+          </a:p>
+          <a:p>
+            <a:pPr marL="228600" indent="-228600">
+              <a:lnSpc>
+                <a:spcPct val="80000"/>
+              </a:lnSpc>
+              <a:spcBef>
+                <a:spcPts val="1000"/>
+              </a:spcBef>
+              <a:buSzPct val="100000"/>
+              <a:buAutoNum type="arabicPeriod" startAt="2"/>
+              <a:defRPr b="0" sz="1100">
+                <a:solidFill>
+                  <a:srgbClr val="7A4300"/>
+                </a:solidFill>
+              </a:defRPr>
+            </a:pPr>
+            <a:r>
+              <a:t>Press </a:t>
+            </a:r>
+            <a:r>
+              <a:rPr>
+                <a:latin typeface="Source Sans Pro Semibold"/>
+                <a:ea typeface="Source Sans Pro Semibold"/>
+                <a:cs typeface="Source Sans Pro Semibold"/>
+                <a:sym typeface="Source Sans Pro Semibold"/>
+              </a:rPr>
+              <a:t>Enter</a:t>
+            </a:r>
+            <a:r>
+              <a:t> to run code</a:t>
+            </a:r>
+          </a:p>
+          <a:p>
+            <a:pPr marL="228600" indent="-228600">
+              <a:lnSpc>
+                <a:spcPct val="80000"/>
+              </a:lnSpc>
+              <a:spcBef>
+                <a:spcPts val="1000"/>
+              </a:spcBef>
+              <a:buSzPct val="100000"/>
+              <a:buAutoNum type="arabicPeriod" startAt="2"/>
+              <a:defRPr b="0" sz="1100">
+                <a:solidFill>
+                  <a:srgbClr val="7A4300"/>
+                </a:solidFill>
+              </a:defRPr>
+            </a:pPr>
+            <a:r>
+              <a:t>Type </a:t>
+            </a:r>
+            <a:r>
+              <a:rPr>
+                <a:latin typeface="Source Sans Pro Semibold"/>
+                <a:ea typeface="Source Sans Pro Semibold"/>
+                <a:cs typeface="Source Sans Pro Semibold"/>
+                <a:sym typeface="Source Sans Pro Semibold"/>
+              </a:rPr>
+              <a:t>exit </a:t>
+            </a:r>
+            <a:r>
+              <a:t>to close and return to R console</a:t>
+            </a:r>
+          </a:p>
+        </p:txBody>
+      </p:sp>
       <p:pic>
         <p:nvPicPr>
-          <p:cNvPr id="218" name="Screen Shot 2019-04-24 at 3.06.42 PM.png" descr="Screen Shot 2019-04-24 at 3.06.42 PM.png"/>
+          <p:cNvPr id="223" name="Screen Shot 2019-04-24 at 3.35.32 PM.png" descr="Screen Shot 2019-04-24 at 3.35.32 PM.png"/>
           <p:cNvPicPr>
             <a:picLocks noChangeAspect="1"/>
           </p:cNvPicPr>
@@ -9911,34 +10227,43 @@
           <a:blip r:embed="rId11">
             <a:extLst/>
           </a:blip>
-          <a:srcRect l="473" t="1694" r="473" b="1694"/>
           <a:stretch>
             <a:fillRect/>
           </a:stretch>
         </p:blipFill>
         <p:spPr>
           <a:xfrm>
-            <a:off x="2784441" y="3304951"/>
-            <a:ext cx="833557" cy="454668"/>
+            <a:off x="3145021" y="6830041"/>
+            <a:ext cx="3669274" cy="3359657"/>
           </a:xfrm>
           <a:prstGeom prst="rect">
             <a:avLst/>
           </a:prstGeom>
-          <a:ln w="12700">
+          <a:ln w="19050">
+            <a:solidFill>
+              <a:srgbClr val="000000"/>
+            </a:solidFill>
             <a:miter lim="400000"/>
           </a:ln>
+          <a:effectLst>
+            <a:outerShdw sx="100000" sy="100000" kx="0" ky="0" algn="b" rotWithShape="0" blurRad="76200" dist="63500" dir="5400000">
+              <a:srgbClr val="000000">
+                <a:alpha val="50000"/>
+              </a:srgbClr>
+            </a:outerShdw>
+          </a:effectLst>
         </p:spPr>
       </p:pic>
       <p:sp>
         <p:nvSpPr>
-          <p:cNvPr id="219" name="Line"/>
+          <p:cNvPr id="224" name="Line"/>
           <p:cNvSpPr/>
           <p:nvPr/>
         </p:nvSpPr>
         <p:spPr>
-          <a:xfrm flipH="1" flipV="1">
-            <a:off x="752720" y="1815817"/>
-            <a:ext cx="556539" cy="719955"/>
+          <a:xfrm flipV="1">
+            <a:off x="850756" y="5964965"/>
+            <a:ext cx="239669" cy="479450"/>
           </a:xfrm>
           <a:prstGeom prst="line">
             <a:avLst/>
@@ -9975,146 +10300,14 @@
       </p:sp>
       <p:sp>
         <p:nvSpPr>
-          <p:cNvPr id="220" name="Line"/>
-          <p:cNvSpPr/>
-          <p:nvPr/>
-        </p:nvSpPr>
-        <p:spPr>
-          <a:xfrm flipH="1" flipV="1">
-            <a:off x="2269104" y="1834556"/>
-            <a:ext cx="685209" cy="1467847"/>
-          </a:xfrm>
-          <a:prstGeom prst="line">
-            <a:avLst/>
-          </a:prstGeom>
-          <a:ln>
-            <a:solidFill>
-              <a:srgbClr val="000000"/>
-            </a:solidFill>
-            <a:custDash>
-              <a:ds d="100000" sp="200000"/>
-            </a:custDash>
-          </a:ln>
-        </p:spPr>
-        <p:txBody>
-          <a:bodyPr lIns="54570" tIns="54570" rIns="54570" bIns="54570" anchor="ctr"/>
-          <a:lstStyle/>
-          <a:p>
-            <a:pPr algn="ctr">
-              <a:spcBef>
-                <a:spcPts val="0"/>
-              </a:spcBef>
-              <a:defRPr b="0" sz="2600">
-                <a:solidFill>
-                  <a:srgbClr val="000000"/>
-                </a:solidFill>
-                <a:latin typeface="Helvetica Light"/>
-                <a:ea typeface="Helvetica Light"/>
-                <a:cs typeface="Helvetica Light"/>
-                <a:sym typeface="Helvetica Light"/>
-              </a:defRPr>
-            </a:pPr>
-          </a:p>
-        </p:txBody>
-      </p:sp>
-      <p:sp>
-        <p:nvSpPr>
-          <p:cNvPr id="221" name="Line"/>
-          <p:cNvSpPr/>
-          <p:nvPr/>
-        </p:nvSpPr>
-        <p:spPr>
-          <a:xfrm flipH="1" flipV="1">
-            <a:off x="3261816" y="1688817"/>
-            <a:ext cx="107287" cy="679037"/>
-          </a:xfrm>
-          <a:prstGeom prst="line">
-            <a:avLst/>
-          </a:prstGeom>
-          <a:ln>
-            <a:solidFill>
-              <a:srgbClr val="000000"/>
-            </a:solidFill>
-            <a:custDash>
-              <a:ds d="100000" sp="200000"/>
-            </a:custDash>
-          </a:ln>
-        </p:spPr>
-        <p:txBody>
-          <a:bodyPr lIns="54570" tIns="54570" rIns="54570" bIns="54570" anchor="ctr"/>
-          <a:lstStyle/>
-          <a:p>
-            <a:pPr algn="ctr">
-              <a:spcBef>
-                <a:spcPts val="0"/>
-              </a:spcBef>
-              <a:defRPr b="0" sz="2600">
-                <a:solidFill>
-                  <a:srgbClr val="000000"/>
-                </a:solidFill>
-                <a:latin typeface="Helvetica Light"/>
-                <a:ea typeface="Helvetica Light"/>
-                <a:cs typeface="Helvetica Light"/>
-                <a:sym typeface="Helvetica Light"/>
-              </a:defRPr>
-            </a:pPr>
-          </a:p>
-        </p:txBody>
-      </p:sp>
-      <p:sp>
-        <p:nvSpPr>
-          <p:cNvPr id="222" name="Line"/>
-          <p:cNvSpPr/>
-          <p:nvPr/>
-        </p:nvSpPr>
-        <p:spPr>
-          <a:xfrm flipV="1">
-            <a:off x="5144595" y="1909512"/>
-            <a:ext cx="118919" cy="846956"/>
-          </a:xfrm>
-          <a:prstGeom prst="line">
-            <a:avLst/>
-          </a:prstGeom>
-          <a:ln>
-            <a:solidFill>
-              <a:srgbClr val="000000"/>
-            </a:solidFill>
-            <a:custDash>
-              <a:ds d="100000" sp="200000"/>
-            </a:custDash>
-          </a:ln>
-        </p:spPr>
-        <p:txBody>
-          <a:bodyPr lIns="54570" tIns="54570" rIns="54570" bIns="54570" anchor="ctr"/>
-          <a:lstStyle/>
-          <a:p>
-            <a:pPr algn="ctr">
-              <a:spcBef>
-                <a:spcPts val="0"/>
-              </a:spcBef>
-              <a:defRPr b="0" sz="2600">
-                <a:solidFill>
-                  <a:srgbClr val="000000"/>
-                </a:solidFill>
-                <a:latin typeface="Helvetica Light"/>
-                <a:ea typeface="Helvetica Light"/>
-                <a:cs typeface="Helvetica Light"/>
-                <a:sym typeface="Helvetica Light"/>
-              </a:defRPr>
-            </a:pPr>
-          </a:p>
-        </p:txBody>
-      </p:sp>
-      <p:sp>
-        <p:nvSpPr>
-          <p:cNvPr id="223" name="A REPL (Read, Eval, Print Loop) is a command line where you can run Python code and view the results.…"/>
+          <p:cNvPr id="225" name="A Python REPL opens in the console when you run Python code with a keyboard shortcut. Type exit to close."/>
           <p:cNvSpPr txBox="1"/>
           <p:nvPr/>
         </p:nvSpPr>
         <p:spPr>
           <a:xfrm>
-            <a:off x="316189" y="7262130"/>
-            <a:ext cx="2679066" cy="3286433"/>
+            <a:off x="473457" y="6350346"/>
+            <a:ext cx="6318017" cy="454820"/>
           </a:xfrm>
           <a:prstGeom prst="rect">
             <a:avLst/>
@@ -10129,35 +10322,72 @@
           </a:extLst>
         </p:spPr>
         <p:txBody>
+          <a:bodyPr lIns="25400" tIns="25400" rIns="25400" bIns="25400" anchor="ctr">
+            <a:normAutofit fontScale="100000" lnSpcReduction="0"/>
+          </a:bodyPr>
+          <a:lstStyle/>
+          <a:p>
+            <a:pPr>
+              <a:lnSpc>
+                <a:spcPct val="80000"/>
+              </a:lnSpc>
+              <a:spcBef>
+                <a:spcPts val="1000"/>
+              </a:spcBef>
+              <a:defRPr b="0" sz="1100">
+                <a:solidFill>
+                  <a:srgbClr val="000000"/>
+                </a:solidFill>
+              </a:defRPr>
+            </a:pPr>
+            <a:r>
+              <a:t>A Python REPL opens in the console when you run Python code with a keyboard shortcut. Type </a:t>
+            </a:r>
+            <a:r>
+              <a:rPr b="1"/>
+              <a:t>exit</a:t>
+            </a:r>
+            <a:r>
+              <a:t> to close.</a:t>
+            </a:r>
+          </a:p>
+        </p:txBody>
+      </p:sp>
+      <p:sp>
+        <p:nvSpPr>
+          <p:cNvPr id="226" name="The instance referenced by the environment…"/>
+          <p:cNvSpPr txBox="1"/>
+          <p:nvPr/>
+        </p:nvSpPr>
+        <p:spPr>
+          <a:xfrm>
+            <a:off x="10570550" y="4625783"/>
+            <a:ext cx="2840113" cy="6335495"/>
+          </a:xfrm>
+          <a:prstGeom prst="rect">
+            <a:avLst/>
+          </a:prstGeom>
+          <a:ln w="12700">
+            <a:miter lim="400000"/>
+          </a:ln>
+          <a:extLst>
+            <a:ext uri="{C572A759-6A51-4108-AA02-DFA0A04FC94B}">
+              <ma14:wrappingTextBoxFlag xmlns:ma14="http://schemas.microsoft.com/office/mac/drawingml/2011/main" val="1"/>
+            </a:ext>
+          </a:extLst>
+        </p:spPr>
+        <p:txBody>
           <a:bodyPr lIns="0" tIns="0" rIns="0" bIns="0">
             <a:normAutofit fontScale="100000" lnSpcReduction="0"/>
           </a:bodyPr>
           <a:lstStyle/>
           <a:p>
-            <a:pPr>
-              <a:lnSpc>
-                <a:spcPct val="80000"/>
-              </a:lnSpc>
-              <a:spcBef>
-                <a:spcPts val="1000"/>
-              </a:spcBef>
-              <a:defRPr b="0" sz="1100">
-                <a:solidFill>
-                  <a:srgbClr val="7A4300"/>
-                </a:solidFill>
-              </a:defRPr>
-            </a:pPr>
-            <a:r>
-              <a:t>A REPL (Read, Eval, Print Loop) is a command line where you can run Python code and view the results.</a:t>
-            </a:r>
-          </a:p>
-          <a:p>
             <a:pPr marL="190500" indent="-190500">
               <a:lnSpc>
                 <a:spcPct val="80000"/>
               </a:lnSpc>
               <a:spcBef>
-                <a:spcPts val="1000"/>
+                <a:spcPts val="0"/>
               </a:spcBef>
               <a:buSzPct val="100000"/>
               <a:buAutoNum type="arabicPeriod" startAt="1"/>
@@ -10168,83 +10398,25 @@
               </a:defRPr>
             </a:pPr>
             <a:r>
-              <a:t>Open in the console with </a:t>
-            </a:r>
-            <a:r>
-              <a:rPr b="1"/>
-              <a:t>repl_python</a:t>
-            </a:r>
-            <a:r>
-              <a:t>(), or by running code in a Python script with </a:t>
-            </a:r>
-            <a:r>
-              <a:rPr b="1"/>
-              <a:t>Cmd + Enter</a:t>
-            </a:r>
-            <a:r>
-              <a:t> (</a:t>
-            </a:r>
-            <a:r>
-              <a:rPr b="1"/>
-              <a:t>Ctrl + Enter</a:t>
-            </a:r>
-            <a:r>
-              <a:t>) .</a:t>
-            </a:r>
-          </a:p>
-          <a:p>
-            <a:pPr marL="381000" indent="-127000">
-              <a:lnSpc>
-                <a:spcPct val="80000"/>
-              </a:lnSpc>
-              <a:spcBef>
-                <a:spcPts val="1000"/>
-              </a:spcBef>
-              <a:buSzPct val="100000"/>
-              <a:buChar char="•"/>
+              <a:t>The instance referenced by the environment </a:t>
+            </a:r>
+          </a:p>
+          <a:p>
+            <a:pPr>
+              <a:lnSpc>
+                <a:spcPct val="80000"/>
+              </a:lnSpc>
+              <a:spcBef>
+                <a:spcPts val="0"/>
+              </a:spcBef>
               <a:defRPr b="0" sz="1100">
                 <a:solidFill>
-                  <a:srgbClr val="000000"/>
-                </a:solidFill>
-              </a:defRPr>
-            </a:pPr>
-            <a:r>
-              <a:rPr b="1"/>
-              <a:t>repl_python</a:t>
-            </a:r>
-            <a:r>
-              <a:t>(module = NULL, quiet = getOption("reticulate.repl.quiet", default = FALSE)) Launch a Python REPL. Run </a:t>
-            </a:r>
-            <a:r>
-              <a:rPr b="1"/>
-              <a:t>exit</a:t>
-            </a:r>
-            <a:r>
-              <a:t> to close. </a:t>
-            </a:r>
-            <a:r>
-              <a:rPr i="1"/>
-              <a:t>repl_python() </a:t>
-            </a:r>
-          </a:p>
-          <a:p>
-            <a:pPr marL="228600" indent="-228600">
-              <a:lnSpc>
-                <a:spcPct val="80000"/>
-              </a:lnSpc>
-              <a:spcBef>
-                <a:spcPts val="1000"/>
-              </a:spcBef>
-              <a:buSzPct val="100000"/>
-              <a:buAutoNum type="arabicPeriod" startAt="2"/>
-              <a:defRPr b="0" sz="1100">
-                <a:solidFill>
                   <a:srgbClr val="7A4300"/>
                 </a:solidFill>
               </a:defRPr>
             </a:pPr>
             <a:r>
-              <a:t>Type commands at </a:t>
+              <a:t>variable </a:t>
             </a:r>
             <a:r>
               <a:rPr>
@@ -10253,19 +10425,118 @@
                 <a:cs typeface="Source Sans Pro Semibold"/>
                 <a:sym typeface="Source Sans Pro Semibold"/>
               </a:rPr>
-              <a:t>&gt;&gt;&gt;</a:t>
-            </a:r>
-            <a:r>
-              <a:t> prompt</a:t>
-            </a:r>
-          </a:p>
-          <a:p>
-            <a:pPr marL="228600" indent="-228600">
+              <a:t>RETICULATE_PYTHON </a:t>
+            </a:r>
+            <a:r>
+              <a:t>(if specified). </a:t>
+            </a:r>
+          </a:p>
+          <a:p>
+            <a:pPr>
               <a:lnSpc>
                 <a:spcPct val="80000"/>
               </a:lnSpc>
               <a:spcBef>
                 <a:spcPts val="1000"/>
+              </a:spcBef>
+              <a:defRPr b="0" sz="1100">
+                <a:solidFill>
+                  <a:srgbClr val="7A4300"/>
+                </a:solidFill>
+                <a:latin typeface="Source Sans Pro Semibold"/>
+                <a:ea typeface="Source Sans Pro Semibold"/>
+                <a:cs typeface="Source Sans Pro Semibold"/>
+                <a:sym typeface="Source Sans Pro Semibold"/>
+              </a:defRPr>
+            </a:pPr>
+            <a:r>
+              <a:t>Tip: set in .Renviron file.</a:t>
+            </a:r>
+          </a:p>
+          <a:p>
+            <a:pPr marL="381000" indent="-127000">
+              <a:lnSpc>
+                <a:spcPct val="80000"/>
+              </a:lnSpc>
+              <a:spcBef>
+                <a:spcPts val="0"/>
+              </a:spcBef>
+              <a:buSzPct val="100000"/>
+              <a:buChar char="•"/>
+              <a:defRPr b="0" sz="1100">
+                <a:solidFill>
+                  <a:srgbClr val="000000"/>
+                </a:solidFill>
+              </a:defRPr>
+            </a:pPr>
+            <a:r>
+              <a:rPr b="1"/>
+              <a:t>Sys.setenv</a:t>
+            </a:r>
+            <a:r>
+              <a:t>(RETICULATE_PYTHON = PATH) </a:t>
+            </a:r>
+          </a:p>
+          <a:p>
+            <a:pPr indent="254000">
+              <a:lnSpc>
+                <a:spcPct val="80000"/>
+              </a:lnSpc>
+              <a:spcBef>
+                <a:spcPts val="0"/>
+              </a:spcBef>
+              <a:defRPr b="0" sz="1100">
+                <a:solidFill>
+                  <a:srgbClr val="000000"/>
+                </a:solidFill>
+              </a:defRPr>
+            </a:pPr>
+            <a:r>
+              <a:t>Set default Python binary. Persists across sessions! Undo with </a:t>
+            </a:r>
+            <a:r>
+              <a:rPr b="1"/>
+              <a:t>Sys.unsetenv</a:t>
+            </a:r>
+            <a:r>
+              <a:t>.</a:t>
+            </a:r>
+            <a:r>
+              <a:rPr b="1"/>
+              <a:t> </a:t>
+            </a:r>
+            <a:r>
+              <a:rPr i="1"/>
+              <a:t>Sys.setenv(RETICULATE_PYTHON = </a:t>
+            </a:r>
+            <a:endParaRPr i="1"/>
+          </a:p>
+          <a:p>
+            <a:pPr indent="254000">
+              <a:lnSpc>
+                <a:spcPct val="80000"/>
+              </a:lnSpc>
+              <a:spcBef>
+                <a:spcPts val="1400"/>
+              </a:spcBef>
+              <a:defRPr b="0" sz="1100">
+                <a:solidFill>
+                  <a:srgbClr val="000000"/>
+                </a:solidFill>
+              </a:defRPr>
+            </a:pPr>
+            <a:r>
+              <a:rPr i="1"/>
+              <a:t>"/usr/local/bin/python")</a:t>
+            </a:r>
+          </a:p>
+          <a:p>
+            <a:pPr marL="190500" indent="-190500">
+              <a:lnSpc>
+                <a:spcPct val="80000"/>
+              </a:lnSpc>
+              <a:spcBef>
+                <a:spcPts val="0"/>
               </a:spcBef>
               <a:buSzPct val="100000"/>
               <a:buAutoNum type="arabicPeriod" startAt="2"/>
@@ -10276,7 +10547,7 @@
               </a:defRPr>
             </a:pPr>
             <a:r>
-              <a:t>Press </a:t>
+              <a:t>The instances referenced by </a:t>
             </a:r>
             <a:r>
               <a:rPr>
@@ -10285,30 +10556,10 @@
                 <a:cs typeface="Source Sans Pro Semibold"/>
                 <a:sym typeface="Source Sans Pro Semibold"/>
               </a:rPr>
-              <a:t>Enter</a:t>
-            </a:r>
-            <a:r>
-              <a:t> to run code</a:t>
-            </a:r>
-          </a:p>
-          <a:p>
-            <a:pPr marL="228600" indent="-228600">
-              <a:lnSpc>
-                <a:spcPct val="80000"/>
-              </a:lnSpc>
-              <a:spcBef>
-                <a:spcPts val="1000"/>
-              </a:spcBef>
-              <a:buSzPct val="100000"/>
-              <a:buAutoNum type="arabicPeriod" startAt="2"/>
-              <a:defRPr b="0" sz="1100">
-                <a:solidFill>
-                  <a:srgbClr val="7A4300"/>
-                </a:solidFill>
-              </a:defRPr>
-            </a:pPr>
-            <a:r>
-              <a:t>Type </a:t>
+              <a:t>use_ </a:t>
+            </a:r>
+            <a:r>
+              <a:t>functions</a:t>
             </a:r>
             <a:r>
               <a:rPr>
@@ -10317,17 +10568,386 @@
                 <a:cs typeface="Source Sans Pro Semibold"/>
                 <a:sym typeface="Source Sans Pro Semibold"/>
               </a:rPr>
-              <a:t>exit </a:t>
-            </a:r>
-            <a:r>
-              <a:t>to close and return to R console</a:t>
+              <a:t> </a:t>
+            </a:r>
+            <a:endParaRPr>
+              <a:latin typeface="Source Sans Pro Semibold"/>
+              <a:ea typeface="Source Sans Pro Semibold"/>
+              <a:cs typeface="Source Sans Pro Semibold"/>
+              <a:sym typeface="Source Sans Pro Semibold"/>
+            </a:endParaRPr>
+          </a:p>
+          <a:p>
+            <a:pPr>
+              <a:lnSpc>
+                <a:spcPct val="80000"/>
+              </a:lnSpc>
+              <a:spcBef>
+                <a:spcPts val="1400"/>
+              </a:spcBef>
+              <a:defRPr b="0" sz="1100">
+                <a:solidFill>
+                  <a:srgbClr val="7A4300"/>
+                </a:solidFill>
+              </a:defRPr>
+            </a:pPr>
+            <a:r>
+              <a:t>if called before import(). Will fail silently if called after import unless </a:t>
+            </a:r>
+            <a:r>
+              <a:rPr>
+                <a:latin typeface="Source Sans Pro Semibold"/>
+                <a:ea typeface="Source Sans Pro Semibold"/>
+                <a:cs typeface="Source Sans Pro Semibold"/>
+                <a:sym typeface="Source Sans Pro Semibold"/>
+              </a:rPr>
+              <a:t>required = TRUE</a:t>
+            </a:r>
+            <a:r>
+              <a:t>.</a:t>
+            </a:r>
+          </a:p>
+          <a:p>
+            <a:pPr marL="381000" indent="-127000">
+              <a:lnSpc>
+                <a:spcPct val="80000"/>
+              </a:lnSpc>
+              <a:spcBef>
+                <a:spcPts val="0"/>
+              </a:spcBef>
+              <a:buSzPct val="100000"/>
+              <a:buChar char="•"/>
+              <a:defRPr b="0" sz="1100">
+                <a:solidFill>
+                  <a:srgbClr val="000000"/>
+                </a:solidFill>
+              </a:defRPr>
+            </a:pPr>
+            <a:r>
+              <a:rPr b="1"/>
+              <a:t>use_python</a:t>
+            </a:r>
+            <a:r>
+              <a:t>(python, required = FALSE) </a:t>
+            </a:r>
+          </a:p>
+          <a:p>
+            <a:pPr indent="254000">
+              <a:lnSpc>
+                <a:spcPct val="80000"/>
+              </a:lnSpc>
+              <a:spcBef>
+                <a:spcPts val="0"/>
+              </a:spcBef>
+              <a:defRPr b="0" sz="1100">
+                <a:solidFill>
+                  <a:srgbClr val="000000"/>
+                </a:solidFill>
+              </a:defRPr>
+            </a:pPr>
+            <a:r>
+              <a:t>Suggest a Python binary to use by path. </a:t>
+            </a:r>
+          </a:p>
+          <a:p>
+            <a:pPr indent="254000">
+              <a:lnSpc>
+                <a:spcPct val="80000"/>
+              </a:lnSpc>
+              <a:spcBef>
+                <a:spcPts val="1000"/>
+              </a:spcBef>
+              <a:defRPr b="0" sz="1100">
+                <a:solidFill>
+                  <a:srgbClr val="000000"/>
+                </a:solidFill>
+              </a:defRPr>
+            </a:pPr>
+            <a:r>
+              <a:rPr i="1"/>
+              <a:t>use_python("/usr/local/bin/python")</a:t>
+            </a:r>
+            <a:endParaRPr i="1"/>
+          </a:p>
+          <a:p>
+            <a:pPr marL="381000" indent="-127000">
+              <a:lnSpc>
+                <a:spcPct val="80000"/>
+              </a:lnSpc>
+              <a:spcBef>
+                <a:spcPts val="0"/>
+              </a:spcBef>
+              <a:buSzPct val="100000"/>
+              <a:buChar char="•"/>
+              <a:defRPr b="0" sz="1100">
+                <a:solidFill>
+                  <a:srgbClr val="000000"/>
+                </a:solidFill>
+              </a:defRPr>
+            </a:pPr>
+            <a:r>
+              <a:rPr b="1"/>
+              <a:t>use_virtualenv</a:t>
+            </a:r>
+            <a:r>
+              <a:t>(virtualenv = NULL, required = FALSE) Suggest a Python </a:t>
+            </a:r>
+          </a:p>
+          <a:p>
+            <a:pPr indent="254000">
+              <a:lnSpc>
+                <a:spcPct val="80000"/>
+              </a:lnSpc>
+              <a:spcBef>
+                <a:spcPts val="1000"/>
+              </a:spcBef>
+              <a:defRPr b="0" sz="1100">
+                <a:solidFill>
+                  <a:srgbClr val="000000"/>
+                </a:solidFill>
+              </a:defRPr>
+            </a:pPr>
+            <a:r>
+              <a:t>virtualenv. </a:t>
+            </a:r>
+            <a:r>
+              <a:rPr i="1"/>
+              <a:t>use_virtualenv("~/myenv")</a:t>
+            </a:r>
+            <a:endParaRPr i="1"/>
+          </a:p>
+          <a:p>
+            <a:pPr marL="381000" indent="-127000">
+              <a:lnSpc>
+                <a:spcPct val="80000"/>
+              </a:lnSpc>
+              <a:spcBef>
+                <a:spcPts val="0"/>
+              </a:spcBef>
+              <a:buSzPct val="100000"/>
+              <a:buChar char="•"/>
+              <a:defRPr b="0" sz="1100">
+                <a:solidFill>
+                  <a:srgbClr val="000000"/>
+                </a:solidFill>
+              </a:defRPr>
+            </a:pPr>
+            <a:r>
+              <a:rPr b="1"/>
+              <a:t>use_condaenv</a:t>
+            </a:r>
+            <a:r>
+              <a:t>(condaenv = NULL, </a:t>
+            </a:r>
+          </a:p>
+          <a:p>
+            <a:pPr indent="254000">
+              <a:lnSpc>
+                <a:spcPct val="80000"/>
+              </a:lnSpc>
+              <a:spcBef>
+                <a:spcPts val="0"/>
+              </a:spcBef>
+              <a:defRPr b="0" sz="1100">
+                <a:solidFill>
+                  <a:srgbClr val="000000"/>
+                </a:solidFill>
+              </a:defRPr>
+            </a:pPr>
+            <a:r>
+              <a:t>conda = "auto", required = FALSE) </a:t>
+            </a:r>
+          </a:p>
+          <a:p>
+            <a:pPr indent="254000">
+              <a:lnSpc>
+                <a:spcPct val="80000"/>
+              </a:lnSpc>
+              <a:spcBef>
+                <a:spcPts val="0"/>
+              </a:spcBef>
+              <a:defRPr b="0" sz="1100">
+                <a:solidFill>
+                  <a:srgbClr val="000000"/>
+                </a:solidFill>
+              </a:defRPr>
+            </a:pPr>
+            <a:r>
+              <a:t>Suggest a Conda env to use. </a:t>
+            </a:r>
+            <a:r>
+              <a:rPr i="1"/>
+              <a:t>use_condaenv(condaenv = "r-nlp", </a:t>
+            </a:r>
+            <a:endParaRPr i="1"/>
+          </a:p>
+          <a:p>
+            <a:pPr indent="254000">
+              <a:lnSpc>
+                <a:spcPct val="80000"/>
+              </a:lnSpc>
+              <a:spcBef>
+                <a:spcPts val="1400"/>
+              </a:spcBef>
+              <a:defRPr b="0" sz="1100">
+                <a:solidFill>
+                  <a:srgbClr val="000000"/>
+                </a:solidFill>
+              </a:defRPr>
+            </a:pPr>
+            <a:r>
+              <a:rPr i="1"/>
+              <a:t>conda = "/opt/anaconda3/bin/conda")</a:t>
+            </a:r>
+          </a:p>
+          <a:p>
+            <a:pPr marL="190500" indent="-190500">
+              <a:lnSpc>
+                <a:spcPct val="80000"/>
+              </a:lnSpc>
+              <a:spcBef>
+                <a:spcPts val="0"/>
+              </a:spcBef>
+              <a:buSzPct val="100000"/>
+              <a:buAutoNum type="arabicPeriod" startAt="3"/>
+              <a:defRPr b="0" sz="1100">
+                <a:solidFill>
+                  <a:srgbClr val="7A4300"/>
+                </a:solidFill>
+              </a:defRPr>
+            </a:pPr>
+            <a:r>
+              <a:t>Within virtualenvs and conda envs that carry </a:t>
+            </a:r>
+          </a:p>
+          <a:p>
+            <a:pPr>
+              <a:lnSpc>
+                <a:spcPct val="80000"/>
+              </a:lnSpc>
+              <a:spcBef>
+                <a:spcPts val="0"/>
+              </a:spcBef>
+              <a:defRPr b="0" sz="1100">
+                <a:solidFill>
+                  <a:srgbClr val="7A4300"/>
+                </a:solidFill>
+              </a:defRPr>
+            </a:pPr>
+            <a:r>
+              <a:t>the same name as the imported module. </a:t>
+            </a:r>
+          </a:p>
+          <a:p>
+            <a:pPr>
+              <a:lnSpc>
+                <a:spcPct val="80000"/>
+              </a:lnSpc>
+              <a:spcBef>
+                <a:spcPts val="1400"/>
+              </a:spcBef>
+              <a:defRPr b="0" sz="1100">
+                <a:solidFill>
+                  <a:srgbClr val="7A4300"/>
+                </a:solidFill>
+              </a:defRPr>
+            </a:pPr>
+            <a:r>
+              <a:t>e.g. </a:t>
+            </a:r>
+            <a:r>
+              <a:rPr i="1"/>
+              <a:t>~/anaconda/envs/nltk </a:t>
+            </a:r>
+            <a:r>
+              <a:t>for </a:t>
+            </a:r>
+            <a:r>
+              <a:rPr i="1"/>
+              <a:t>import("nltk")</a:t>
+            </a:r>
+          </a:p>
+          <a:p>
+            <a:pPr marL="190500" indent="-190500">
+              <a:lnSpc>
+                <a:spcPct val="80000"/>
+              </a:lnSpc>
+              <a:spcBef>
+                <a:spcPts val="1400"/>
+              </a:spcBef>
+              <a:buSzPct val="100000"/>
+              <a:buAutoNum type="arabicPeriod" startAt="4"/>
+              <a:defRPr b="0" sz="1100">
+                <a:solidFill>
+                  <a:srgbClr val="7A4300"/>
+                </a:solidFill>
+              </a:defRPr>
+            </a:pPr>
+            <a:r>
+              <a:t>At the location of the Python binary discovered on the system PATH (i.e. </a:t>
+            </a:r>
+            <a:r>
+              <a:rPr>
+                <a:latin typeface="Source Sans Pro Semibold"/>
+                <a:ea typeface="Source Sans Pro Semibold"/>
+                <a:cs typeface="Source Sans Pro Semibold"/>
+                <a:sym typeface="Source Sans Pro Semibold"/>
+              </a:rPr>
+              <a:t>Sys.which("python")</a:t>
+            </a:r>
+            <a:r>
+              <a:t>)</a:t>
+            </a:r>
+          </a:p>
+          <a:p>
+            <a:pPr marL="177800" indent="-177800">
+              <a:lnSpc>
+                <a:spcPct val="80000"/>
+              </a:lnSpc>
+              <a:spcBef>
+                <a:spcPts val="0"/>
+              </a:spcBef>
+              <a:buSzPct val="100000"/>
+              <a:buAutoNum type="arabicPeriod" startAt="4"/>
+              <a:defRPr b="0" sz="1100">
+                <a:solidFill>
+                  <a:srgbClr val="7A4300"/>
+                </a:solidFill>
+              </a:defRPr>
+            </a:pPr>
+            <a:r>
+              <a:t>At customary locations for Python, e.g.</a:t>
+            </a:r>
+            <a:r>
+              <a:rPr>
+                <a:latin typeface="Source Sans Pro Semibold"/>
+                <a:ea typeface="Source Sans Pro Semibold"/>
+                <a:cs typeface="Source Sans Pro Semibold"/>
+                <a:sym typeface="Source Sans Pro Semibold"/>
+              </a:rPr>
+              <a:t>/usr/local/bin/python</a:t>
+            </a:r>
+            <a:r>
+              <a:t>, </a:t>
+            </a:r>
+            <a:r>
+              <a:rPr>
+                <a:latin typeface="Source Sans Pro Semibold"/>
+                <a:ea typeface="Source Sans Pro Semibold"/>
+                <a:cs typeface="Source Sans Pro Semibold"/>
+                <a:sym typeface="Source Sans Pro Semibold"/>
+              </a:rPr>
+              <a:t>/opt/local/bin/python..</a:t>
+            </a:r>
+            <a:r>
+              <a:t>.</a:t>
             </a:r>
           </a:p>
         </p:txBody>
       </p:sp>
       <p:pic>
         <p:nvPicPr>
-          <p:cNvPr id="224" name="Screen Shot 2019-04-24 at 3.35.32 PM.png" descr="Screen Shot 2019-04-24 at 3.35.32 PM.png"/>
+          <p:cNvPr id="227" name="reticulate.png" descr="reticulate.png"/>
           <p:cNvPicPr>
             <a:picLocks noChangeAspect="1"/>
           </p:cNvPicPr>
@@ -10343,81 +10963,8 @@
         </p:blipFill>
         <p:spPr>
           <a:xfrm>
-            <a:off x="3145021" y="6830041"/>
-            <a:ext cx="3669274" cy="3359658"/>
-          </a:xfrm>
-          <a:prstGeom prst="rect">
-            <a:avLst/>
-          </a:prstGeom>
-          <a:ln w="19050">
-            <a:solidFill>
-              <a:srgbClr val="000000"/>
-            </a:solidFill>
-            <a:miter lim="400000"/>
-          </a:ln>
-          <a:effectLst>
-            <a:outerShdw sx="100000" sy="100000" kx="0" ky="0" algn="b" rotWithShape="0" blurRad="76200" dist="63500" dir="5400000">
-              <a:srgbClr val="000000">
-                <a:alpha val="50000"/>
-              </a:srgbClr>
-            </a:outerShdw>
-          </a:effectLst>
-        </p:spPr>
-      </p:pic>
-      <p:sp>
-        <p:nvSpPr>
-          <p:cNvPr id="225" name="Line"/>
-          <p:cNvSpPr/>
-          <p:nvPr/>
-        </p:nvSpPr>
-        <p:spPr>
-          <a:xfrm flipV="1">
-            <a:off x="850756" y="5964965"/>
-            <a:ext cx="239669" cy="479450"/>
-          </a:xfrm>
-          <a:prstGeom prst="line">
-            <a:avLst/>
-          </a:prstGeom>
-          <a:ln>
-            <a:solidFill>
-              <a:srgbClr val="000000"/>
-            </a:solidFill>
-            <a:custDash>
-              <a:ds d="100000" sp="200000"/>
-            </a:custDash>
-          </a:ln>
-        </p:spPr>
-        <p:txBody>
-          <a:bodyPr lIns="54570" tIns="54570" rIns="54570" bIns="54570" anchor="ctr"/>
-          <a:lstStyle/>
-          <a:p>
-            <a:pPr algn="ctr">
-              <a:spcBef>
-                <a:spcPts val="0"/>
-              </a:spcBef>
-              <a:defRPr b="0" sz="2600">
-                <a:solidFill>
-                  <a:srgbClr val="000000"/>
-                </a:solidFill>
-                <a:latin typeface="Helvetica Light"/>
-                <a:ea typeface="Helvetica Light"/>
-                <a:cs typeface="Helvetica Light"/>
-                <a:sym typeface="Helvetica Light"/>
-              </a:defRPr>
-            </a:pPr>
-          </a:p>
-        </p:txBody>
-      </p:sp>
-      <p:sp>
-        <p:nvSpPr>
-          <p:cNvPr id="226" name="A Python REPL opens in the console when you run Python code with a keyboard shortcut. Type exit to close."/>
-          <p:cNvSpPr txBox="1"/>
-          <p:nvPr/>
-        </p:nvSpPr>
-        <p:spPr>
-          <a:xfrm>
-            <a:off x="473457" y="6350346"/>
-            <a:ext cx="6318017" cy="454820"/>
+            <a:off x="12287758" y="217925"/>
+            <a:ext cx="1358901" cy="1575216"/>
           </a:xfrm>
           <a:prstGeom prst="rect">
             <a:avLst/>
@@ -10425,636 +10972,8 @@
           <a:ln w="12700">
             <a:miter lim="400000"/>
           </a:ln>
-          <a:extLst>
-            <a:ext uri="{C572A759-6A51-4108-AA02-DFA0A04FC94B}">
-              <ma14:wrappingTextBoxFlag xmlns:ma14="http://schemas.microsoft.com/office/mac/drawingml/2011/main" val="1"/>
-            </a:ext>
-          </a:extLst>
-        </p:spPr>
-        <p:txBody>
-          <a:bodyPr lIns="25400" tIns="25400" rIns="25400" bIns="25400" anchor="ctr">
-            <a:normAutofit fontScale="100000" lnSpcReduction="0"/>
-          </a:bodyPr>
-          <a:lstStyle/>
-          <a:p>
-            <a:pPr>
-              <a:lnSpc>
-                <a:spcPct val="80000"/>
-              </a:lnSpc>
-              <a:spcBef>
-                <a:spcPts val="1000"/>
-              </a:spcBef>
-              <a:defRPr b="0" sz="1100">
-                <a:solidFill>
-                  <a:srgbClr val="000000"/>
-                </a:solidFill>
-              </a:defRPr>
-            </a:pPr>
-            <a:r>
-              <a:t>A Python REPL opens in the console when you run Python code with a keyboard shortcut. Type </a:t>
-            </a:r>
-            <a:r>
-              <a:rPr b="1"/>
-              <a:t>exit</a:t>
-            </a:r>
-            <a:r>
-              <a:t> to close.</a:t>
-            </a:r>
-          </a:p>
-        </p:txBody>
-      </p:sp>
-      <p:sp>
-        <p:nvSpPr>
-          <p:cNvPr id="227" name="The instance referenced by the environment…"/>
-          <p:cNvSpPr txBox="1"/>
-          <p:nvPr/>
-        </p:nvSpPr>
-        <p:spPr>
-          <a:xfrm>
-            <a:off x="10570550" y="4625783"/>
-            <a:ext cx="2840113" cy="6335495"/>
-          </a:xfrm>
-          <a:prstGeom prst="rect">
-            <a:avLst/>
-          </a:prstGeom>
-          <a:ln w="12700">
-            <a:miter lim="400000"/>
-          </a:ln>
-          <a:extLst>
-            <a:ext uri="{C572A759-6A51-4108-AA02-DFA0A04FC94B}">
-              <ma14:wrappingTextBoxFlag xmlns:ma14="http://schemas.microsoft.com/office/mac/drawingml/2011/main" val="1"/>
-            </a:ext>
-          </a:extLst>
-        </p:spPr>
-        <p:txBody>
-          <a:bodyPr lIns="0" tIns="0" rIns="0" bIns="0">
-            <a:normAutofit fontScale="100000" lnSpcReduction="0"/>
-          </a:bodyPr>
-          <a:lstStyle/>
-          <a:p>
-            <a:pPr marL="190500" indent="-190500">
-              <a:lnSpc>
-                <a:spcPct val="80000"/>
-              </a:lnSpc>
-              <a:spcBef>
-                <a:spcPts val="0"/>
-              </a:spcBef>
-              <a:buSzPct val="100000"/>
-              <a:buAutoNum type="arabicPeriod" startAt="1"/>
-              <a:defRPr b="0" sz="1100">
-                <a:solidFill>
-                  <a:srgbClr val="7A4300"/>
-                </a:solidFill>
-              </a:defRPr>
-            </a:pPr>
-            <a:r>
-              <a:t>The instance referenced by the environment </a:t>
-            </a:r>
-          </a:p>
-          <a:p>
-            <a:pPr>
-              <a:lnSpc>
-                <a:spcPct val="80000"/>
-              </a:lnSpc>
-              <a:spcBef>
-                <a:spcPts val="0"/>
-              </a:spcBef>
-              <a:defRPr b="0" sz="1100">
-                <a:solidFill>
-                  <a:srgbClr val="7A4300"/>
-                </a:solidFill>
-              </a:defRPr>
-            </a:pPr>
-            <a:r>
-              <a:t>variable </a:t>
-            </a:r>
-            <a:r>
-              <a:rPr>
-                <a:latin typeface="Source Sans Pro Semibold"/>
-                <a:ea typeface="Source Sans Pro Semibold"/>
-                <a:cs typeface="Source Sans Pro Semibold"/>
-                <a:sym typeface="Source Sans Pro Semibold"/>
-              </a:rPr>
-              <a:t>RETICULATE_PYTHON </a:t>
-            </a:r>
-            <a:r>
-              <a:t>(if specified). </a:t>
-            </a:r>
-          </a:p>
-          <a:p>
-            <a:pPr>
-              <a:lnSpc>
-                <a:spcPct val="80000"/>
-              </a:lnSpc>
-              <a:spcBef>
-                <a:spcPts val="1000"/>
-              </a:spcBef>
-              <a:defRPr b="0" sz="1100">
-                <a:solidFill>
-                  <a:srgbClr val="7A4300"/>
-                </a:solidFill>
-                <a:latin typeface="Source Sans Pro Semibold"/>
-                <a:ea typeface="Source Sans Pro Semibold"/>
-                <a:cs typeface="Source Sans Pro Semibold"/>
-                <a:sym typeface="Source Sans Pro Semibold"/>
-              </a:defRPr>
-            </a:pPr>
-            <a:r>
-              <a:t>Tip: set in .Renviron file.</a:t>
-            </a:r>
-          </a:p>
-          <a:p>
-            <a:pPr marL="381000" indent="-127000">
-              <a:lnSpc>
-                <a:spcPct val="80000"/>
-              </a:lnSpc>
-              <a:spcBef>
-                <a:spcPts val="0"/>
-              </a:spcBef>
-              <a:buSzPct val="100000"/>
-              <a:buChar char="•"/>
-              <a:defRPr b="0" sz="1100">
-                <a:solidFill>
-                  <a:srgbClr val="000000"/>
-                </a:solidFill>
-              </a:defRPr>
-            </a:pPr>
-            <a:r>
-              <a:rPr b="1"/>
-              <a:t>Sys.setenv</a:t>
-            </a:r>
-            <a:r>
-              <a:t>(RETICULATE_PYTHON = PATH) </a:t>
-            </a:r>
-          </a:p>
-          <a:p>
-            <a:pPr indent="254000">
-              <a:lnSpc>
-                <a:spcPct val="80000"/>
-              </a:lnSpc>
-              <a:spcBef>
-                <a:spcPts val="0"/>
-              </a:spcBef>
-              <a:defRPr b="0" sz="1100">
-                <a:solidFill>
-                  <a:srgbClr val="000000"/>
-                </a:solidFill>
-              </a:defRPr>
-            </a:pPr>
-            <a:r>
-              <a:t>Set default Python binary. Persists across sessions! Undo with </a:t>
-            </a:r>
-            <a:r>
-              <a:rPr b="1"/>
-              <a:t>Sys.unsetenv</a:t>
-            </a:r>
-            <a:r>
-              <a:t>.</a:t>
-            </a:r>
-            <a:r>
-              <a:rPr b="1"/>
-              <a:t> </a:t>
-            </a:r>
-            <a:r>
-              <a:rPr i="1"/>
-              <a:t>Sys.setenv(RETICULATE_PYTHON = </a:t>
-            </a:r>
-            <a:endParaRPr i="1"/>
-          </a:p>
-          <a:p>
-            <a:pPr indent="254000">
-              <a:lnSpc>
-                <a:spcPct val="80000"/>
-              </a:lnSpc>
-              <a:spcBef>
-                <a:spcPts val="1400"/>
-              </a:spcBef>
-              <a:defRPr b="0" sz="1100">
-                <a:solidFill>
-                  <a:srgbClr val="000000"/>
-                </a:solidFill>
-              </a:defRPr>
-            </a:pPr>
-            <a:r>
-              <a:rPr i="1"/>
-              <a:t>"/usr/local/bin/python")</a:t>
-            </a:r>
-          </a:p>
-          <a:p>
-            <a:pPr marL="190500" indent="-190500">
-              <a:lnSpc>
-                <a:spcPct val="80000"/>
-              </a:lnSpc>
-              <a:spcBef>
-                <a:spcPts val="0"/>
-              </a:spcBef>
-              <a:buSzPct val="100000"/>
-              <a:buAutoNum type="arabicPeriod" startAt="2"/>
-              <a:defRPr b="0" sz="1100">
-                <a:solidFill>
-                  <a:srgbClr val="7A4300"/>
-                </a:solidFill>
-              </a:defRPr>
-            </a:pPr>
-            <a:r>
-              <a:t>The instances referenced by </a:t>
-            </a:r>
-            <a:r>
-              <a:rPr>
-                <a:latin typeface="Source Sans Pro Semibold"/>
-                <a:ea typeface="Source Sans Pro Semibold"/>
-                <a:cs typeface="Source Sans Pro Semibold"/>
-                <a:sym typeface="Source Sans Pro Semibold"/>
-              </a:rPr>
-              <a:t>use_ </a:t>
-            </a:r>
-            <a:r>
-              <a:t>functions</a:t>
-            </a:r>
-            <a:r>
-              <a:rPr>
-                <a:latin typeface="Source Sans Pro Semibold"/>
-                <a:ea typeface="Source Sans Pro Semibold"/>
-                <a:cs typeface="Source Sans Pro Semibold"/>
-                <a:sym typeface="Source Sans Pro Semibold"/>
-              </a:rPr>
-              <a:t> </a:t>
-            </a:r>
-            <a:endParaRPr>
-              <a:latin typeface="Source Sans Pro Semibold"/>
-              <a:ea typeface="Source Sans Pro Semibold"/>
-              <a:cs typeface="Source Sans Pro Semibold"/>
-              <a:sym typeface="Source Sans Pro Semibold"/>
-            </a:endParaRPr>
-          </a:p>
-          <a:p>
-            <a:pPr>
-              <a:lnSpc>
-                <a:spcPct val="80000"/>
-              </a:lnSpc>
-              <a:spcBef>
-                <a:spcPts val="1400"/>
-              </a:spcBef>
-              <a:defRPr b="0" sz="1100">
-                <a:solidFill>
-                  <a:srgbClr val="7A4300"/>
-                </a:solidFill>
-              </a:defRPr>
-            </a:pPr>
-            <a:r>
-              <a:t>if called before import(). Will fail silently if called after import unless </a:t>
-            </a:r>
-            <a:r>
-              <a:rPr>
-                <a:latin typeface="Source Sans Pro Semibold"/>
-                <a:ea typeface="Source Sans Pro Semibold"/>
-                <a:cs typeface="Source Sans Pro Semibold"/>
-                <a:sym typeface="Source Sans Pro Semibold"/>
-              </a:rPr>
-              <a:t>required = TRUE</a:t>
-            </a:r>
-            <a:r>
-              <a:t>.</a:t>
-            </a:r>
-          </a:p>
-          <a:p>
-            <a:pPr marL="381000" indent="-127000">
-              <a:lnSpc>
-                <a:spcPct val="80000"/>
-              </a:lnSpc>
-              <a:spcBef>
-                <a:spcPts val="0"/>
-              </a:spcBef>
-              <a:buSzPct val="100000"/>
-              <a:buChar char="•"/>
-              <a:defRPr b="0" sz="1100">
-                <a:solidFill>
-                  <a:srgbClr val="000000"/>
-                </a:solidFill>
-              </a:defRPr>
-            </a:pPr>
-            <a:r>
-              <a:rPr b="1"/>
-              <a:t>use_python</a:t>
-            </a:r>
-            <a:r>
-              <a:t>(python, required = FALSE) </a:t>
-            </a:r>
-          </a:p>
-          <a:p>
-            <a:pPr indent="254000">
-              <a:lnSpc>
-                <a:spcPct val="80000"/>
-              </a:lnSpc>
-              <a:spcBef>
-                <a:spcPts val="0"/>
-              </a:spcBef>
-              <a:defRPr b="0" sz="1100">
-                <a:solidFill>
-                  <a:srgbClr val="000000"/>
-                </a:solidFill>
-              </a:defRPr>
-            </a:pPr>
-            <a:r>
-              <a:t>Suggest a Python binary to use by path. </a:t>
-            </a:r>
-          </a:p>
-          <a:p>
-            <a:pPr indent="254000">
-              <a:lnSpc>
-                <a:spcPct val="80000"/>
-              </a:lnSpc>
-              <a:spcBef>
-                <a:spcPts val="1000"/>
-              </a:spcBef>
-              <a:defRPr b="0" sz="1100">
-                <a:solidFill>
-                  <a:srgbClr val="000000"/>
-                </a:solidFill>
-              </a:defRPr>
-            </a:pPr>
-            <a:r>
-              <a:rPr i="1"/>
-              <a:t>use_python("/usr/local/bin/python")</a:t>
-            </a:r>
-            <a:endParaRPr i="1"/>
-          </a:p>
-          <a:p>
-            <a:pPr marL="381000" indent="-127000">
-              <a:lnSpc>
-                <a:spcPct val="80000"/>
-              </a:lnSpc>
-              <a:spcBef>
-                <a:spcPts val="0"/>
-              </a:spcBef>
-              <a:buSzPct val="100000"/>
-              <a:buChar char="•"/>
-              <a:defRPr b="0" sz="1100">
-                <a:solidFill>
-                  <a:srgbClr val="000000"/>
-                </a:solidFill>
-              </a:defRPr>
-            </a:pPr>
-            <a:r>
-              <a:rPr b="1"/>
-              <a:t>use_virtualenv</a:t>
-            </a:r>
-            <a:r>
-              <a:t>(virtualenv = NULL, required = FALSE) Suggest a Python </a:t>
-            </a:r>
-          </a:p>
-          <a:p>
-            <a:pPr indent="254000">
-              <a:lnSpc>
-                <a:spcPct val="80000"/>
-              </a:lnSpc>
-              <a:spcBef>
-                <a:spcPts val="1000"/>
-              </a:spcBef>
-              <a:defRPr b="0" sz="1100">
-                <a:solidFill>
-                  <a:srgbClr val="000000"/>
-                </a:solidFill>
-              </a:defRPr>
-            </a:pPr>
-            <a:r>
-              <a:t>virtualenv. </a:t>
-            </a:r>
-            <a:r>
-              <a:rPr i="1"/>
-              <a:t>use_virtualenv("~/myenv")</a:t>
-            </a:r>
-            <a:endParaRPr i="1"/>
-          </a:p>
-          <a:p>
-            <a:pPr marL="381000" indent="-127000">
-              <a:lnSpc>
-                <a:spcPct val="80000"/>
-              </a:lnSpc>
-              <a:spcBef>
-                <a:spcPts val="0"/>
-              </a:spcBef>
-              <a:buSzPct val="100000"/>
-              <a:buChar char="•"/>
-              <a:defRPr b="0" sz="1100">
-                <a:solidFill>
-                  <a:srgbClr val="000000"/>
-                </a:solidFill>
-              </a:defRPr>
-            </a:pPr>
-            <a:r>
-              <a:rPr b="1"/>
-              <a:t>use_condaenv</a:t>
-            </a:r>
-            <a:r>
-              <a:t>(condaenv = NULL, </a:t>
-            </a:r>
-          </a:p>
-          <a:p>
-            <a:pPr indent="254000">
-              <a:lnSpc>
-                <a:spcPct val="80000"/>
-              </a:lnSpc>
-              <a:spcBef>
-                <a:spcPts val="0"/>
-              </a:spcBef>
-              <a:defRPr b="0" sz="1100">
-                <a:solidFill>
-                  <a:srgbClr val="000000"/>
-                </a:solidFill>
-              </a:defRPr>
-            </a:pPr>
-            <a:r>
-              <a:t>conda = "auto", required = FALSE) </a:t>
-            </a:r>
-          </a:p>
-          <a:p>
-            <a:pPr indent="254000">
-              <a:lnSpc>
-                <a:spcPct val="80000"/>
-              </a:lnSpc>
-              <a:spcBef>
-                <a:spcPts val="0"/>
-              </a:spcBef>
-              <a:defRPr b="0" sz="1100">
-                <a:solidFill>
-                  <a:srgbClr val="000000"/>
-                </a:solidFill>
-              </a:defRPr>
-            </a:pPr>
-            <a:r>
-              <a:t>Suggest a Conda env to use. </a:t>
-            </a:r>
-            <a:r>
-              <a:rPr i="1"/>
-              <a:t>use_condaenv(condaenv = "r-nlp", </a:t>
-            </a:r>
-            <a:endParaRPr i="1"/>
-          </a:p>
-          <a:p>
-            <a:pPr indent="254000">
-              <a:lnSpc>
-                <a:spcPct val="80000"/>
-              </a:lnSpc>
-              <a:spcBef>
-                <a:spcPts val="1400"/>
-              </a:spcBef>
-              <a:defRPr b="0" sz="1100">
-                <a:solidFill>
-                  <a:srgbClr val="000000"/>
-                </a:solidFill>
-              </a:defRPr>
-            </a:pPr>
-            <a:r>
-              <a:rPr i="1"/>
-              <a:t>conda = "/opt/anaconda3/bin/conda")</a:t>
-            </a:r>
-          </a:p>
-          <a:p>
-            <a:pPr marL="190500" indent="-190500">
-              <a:lnSpc>
-                <a:spcPct val="80000"/>
-              </a:lnSpc>
-              <a:spcBef>
-                <a:spcPts val="0"/>
-              </a:spcBef>
-              <a:buSzPct val="100000"/>
-              <a:buAutoNum type="arabicPeriod" startAt="3"/>
-              <a:defRPr b="0" sz="1100">
-                <a:solidFill>
-                  <a:srgbClr val="7A4300"/>
-                </a:solidFill>
-              </a:defRPr>
-            </a:pPr>
-            <a:r>
-              <a:t>Within virtualenvs and conda envs that carry </a:t>
-            </a:r>
-          </a:p>
-          <a:p>
-            <a:pPr>
-              <a:lnSpc>
-                <a:spcPct val="80000"/>
-              </a:lnSpc>
-              <a:spcBef>
-                <a:spcPts val="0"/>
-              </a:spcBef>
-              <a:defRPr b="0" sz="1100">
-                <a:solidFill>
-                  <a:srgbClr val="7A4300"/>
-                </a:solidFill>
-              </a:defRPr>
-            </a:pPr>
-            <a:r>
-              <a:t>the same name as the imported module. </a:t>
-            </a:r>
-          </a:p>
-          <a:p>
-            <a:pPr>
-              <a:lnSpc>
-                <a:spcPct val="80000"/>
-              </a:lnSpc>
-              <a:spcBef>
-                <a:spcPts val="1400"/>
-              </a:spcBef>
-              <a:defRPr b="0" sz="1100">
-                <a:solidFill>
-                  <a:srgbClr val="7A4300"/>
-                </a:solidFill>
-              </a:defRPr>
-            </a:pPr>
-            <a:r>
-              <a:t>e.g. </a:t>
-            </a:r>
-            <a:r>
-              <a:rPr i="1"/>
-              <a:t>~/anaconda/envs/nltk </a:t>
-            </a:r>
-            <a:r>
-              <a:t>for </a:t>
-            </a:r>
-            <a:r>
-              <a:rPr i="1"/>
-              <a:t>import("nltk")</a:t>
-            </a:r>
-          </a:p>
-          <a:p>
-            <a:pPr marL="190500" indent="-190500">
-              <a:lnSpc>
-                <a:spcPct val="80000"/>
-              </a:lnSpc>
-              <a:spcBef>
-                <a:spcPts val="1400"/>
-              </a:spcBef>
-              <a:buSzPct val="100000"/>
-              <a:buAutoNum type="arabicPeriod" startAt="4"/>
-              <a:defRPr b="0" sz="1100">
-                <a:solidFill>
-                  <a:srgbClr val="7A4300"/>
-                </a:solidFill>
-              </a:defRPr>
-            </a:pPr>
-            <a:r>
-              <a:t>At the location of the Python binary discovered on the system PATH (i.e. </a:t>
-            </a:r>
-            <a:r>
-              <a:rPr>
-                <a:latin typeface="Source Sans Pro Semibold"/>
-                <a:ea typeface="Source Sans Pro Semibold"/>
-                <a:cs typeface="Source Sans Pro Semibold"/>
-                <a:sym typeface="Source Sans Pro Semibold"/>
-              </a:rPr>
-              <a:t>Sys.which("python")</a:t>
-            </a:r>
-            <a:r>
-              <a:t>)</a:t>
-            </a:r>
-          </a:p>
-          <a:p>
-            <a:pPr marL="177800" indent="-177800">
-              <a:lnSpc>
-                <a:spcPct val="80000"/>
-              </a:lnSpc>
-              <a:spcBef>
-                <a:spcPts val="0"/>
-              </a:spcBef>
-              <a:buSzPct val="100000"/>
-              <a:buAutoNum type="arabicPeriod" startAt="4"/>
-              <a:defRPr b="0" sz="1100">
-                <a:solidFill>
-                  <a:srgbClr val="7A4300"/>
-                </a:solidFill>
-              </a:defRPr>
-            </a:pPr>
-            <a:r>
-              <a:t>At customary locations for Python, e.g.</a:t>
-            </a:r>
-            <a:r>
-              <a:rPr>
-                <a:latin typeface="Source Sans Pro Semibold"/>
-                <a:ea typeface="Source Sans Pro Semibold"/>
-                <a:cs typeface="Source Sans Pro Semibold"/>
-                <a:sym typeface="Source Sans Pro Semibold"/>
-              </a:rPr>
-              <a:t>/usr/local/bin/python</a:t>
-            </a:r>
-            <a:r>
-              <a:t>, </a:t>
-            </a:r>
-            <a:r>
-              <a:rPr>
-                <a:latin typeface="Source Sans Pro Semibold"/>
-                <a:ea typeface="Source Sans Pro Semibold"/>
-                <a:cs typeface="Source Sans Pro Semibold"/>
-                <a:sym typeface="Source Sans Pro Semibold"/>
-              </a:rPr>
-              <a:t>/opt/local/bin/python..</a:t>
-            </a:r>
-            <a:r>
-              <a:t>.</a:t>
-            </a:r>
-          </a:p>
-        </p:txBody>
-      </p:sp>
+        </p:spPr>
+      </p:pic>
     </p:spTree>
   </p:cSld>
   <p:clrMapOvr>

</xml_diff>